<commit_message>
add photos and screenshots to presentation
</commit_message>
<xml_diff>
--- a/Presentation/Android Auto Message App.pptx
+++ b/Presentation/Android Auto Message App.pptx
@@ -2,7 +2,7 @@
 <file path=ppt/presentation.xml><?xml version="1.0" encoding="utf-8"?>
 <p:presentation xmlns:a="http://schemas.openxmlformats.org/drawingml/2006/main" xmlns:r="http://schemas.openxmlformats.org/officeDocument/2006/relationships" xmlns:p="http://schemas.openxmlformats.org/presentationml/2006/main" saveSubsetFonts="1">
   <p:sldMasterIdLst>
-    <p:sldMasterId id="2147483648" r:id="rId1"/>
+    <p:sldMasterId id="2147483833" r:id="rId1"/>
   </p:sldMasterIdLst>
   <p:sldIdLst>
     <p:sldId id="256" r:id="rId2"/>
@@ -18,7 +18,7 @@
     <a:defPPr>
       <a:defRPr lang="en-US"/>
     </a:defPPr>
-    <a:lvl1pPr marL="0" algn="l" defTabSz="914400" rtl="0" eaLnBrk="1" latinLnBrk="0" hangingPunct="1">
+    <a:lvl1pPr marL="0" algn="l" defTabSz="457200" rtl="0" eaLnBrk="1" latinLnBrk="0" hangingPunct="1">
       <a:defRPr sz="1800" kern="1200">
         <a:solidFill>
           <a:schemeClr val="tx1"/>
@@ -28,7 +28,7 @@
         <a:cs typeface="+mn-cs"/>
       </a:defRPr>
     </a:lvl1pPr>
-    <a:lvl2pPr marL="457200" algn="l" defTabSz="914400" rtl="0" eaLnBrk="1" latinLnBrk="0" hangingPunct="1">
+    <a:lvl2pPr marL="457200" algn="l" defTabSz="457200" rtl="0" eaLnBrk="1" latinLnBrk="0" hangingPunct="1">
       <a:defRPr sz="1800" kern="1200">
         <a:solidFill>
           <a:schemeClr val="tx1"/>
@@ -38,7 +38,7 @@
         <a:cs typeface="+mn-cs"/>
       </a:defRPr>
     </a:lvl2pPr>
-    <a:lvl3pPr marL="914400" algn="l" defTabSz="914400" rtl="0" eaLnBrk="1" latinLnBrk="0" hangingPunct="1">
+    <a:lvl3pPr marL="914400" algn="l" defTabSz="457200" rtl="0" eaLnBrk="1" latinLnBrk="0" hangingPunct="1">
       <a:defRPr sz="1800" kern="1200">
         <a:solidFill>
           <a:schemeClr val="tx1"/>
@@ -48,7 +48,7 @@
         <a:cs typeface="+mn-cs"/>
       </a:defRPr>
     </a:lvl3pPr>
-    <a:lvl4pPr marL="1371600" algn="l" defTabSz="914400" rtl="0" eaLnBrk="1" latinLnBrk="0" hangingPunct="1">
+    <a:lvl4pPr marL="1371600" algn="l" defTabSz="457200" rtl="0" eaLnBrk="1" latinLnBrk="0" hangingPunct="1">
       <a:defRPr sz="1800" kern="1200">
         <a:solidFill>
           <a:schemeClr val="tx1"/>
@@ -58,7 +58,7 @@
         <a:cs typeface="+mn-cs"/>
       </a:defRPr>
     </a:lvl4pPr>
-    <a:lvl5pPr marL="1828800" algn="l" defTabSz="914400" rtl="0" eaLnBrk="1" latinLnBrk="0" hangingPunct="1">
+    <a:lvl5pPr marL="1828800" algn="l" defTabSz="457200" rtl="0" eaLnBrk="1" latinLnBrk="0" hangingPunct="1">
       <a:defRPr sz="1800" kern="1200">
         <a:solidFill>
           <a:schemeClr val="tx1"/>
@@ -68,7 +68,7 @@
         <a:cs typeface="+mn-cs"/>
       </a:defRPr>
     </a:lvl5pPr>
-    <a:lvl6pPr marL="2286000" algn="l" defTabSz="914400" rtl="0" eaLnBrk="1" latinLnBrk="0" hangingPunct="1">
+    <a:lvl6pPr marL="2286000" algn="l" defTabSz="457200" rtl="0" eaLnBrk="1" latinLnBrk="0" hangingPunct="1">
       <a:defRPr sz="1800" kern="1200">
         <a:solidFill>
           <a:schemeClr val="tx1"/>
@@ -78,7 +78,7 @@
         <a:cs typeface="+mn-cs"/>
       </a:defRPr>
     </a:lvl6pPr>
-    <a:lvl7pPr marL="2743200" algn="l" defTabSz="914400" rtl="0" eaLnBrk="1" latinLnBrk="0" hangingPunct="1">
+    <a:lvl7pPr marL="2743200" algn="l" defTabSz="457200" rtl="0" eaLnBrk="1" latinLnBrk="0" hangingPunct="1">
       <a:defRPr sz="1800" kern="1200">
         <a:solidFill>
           <a:schemeClr val="tx1"/>
@@ -88,7 +88,7 @@
         <a:cs typeface="+mn-cs"/>
       </a:defRPr>
     </a:lvl7pPr>
-    <a:lvl8pPr marL="3200400" algn="l" defTabSz="914400" rtl="0" eaLnBrk="1" latinLnBrk="0" hangingPunct="1">
+    <a:lvl8pPr marL="3200400" algn="l" defTabSz="457200" rtl="0" eaLnBrk="1" latinLnBrk="0" hangingPunct="1">
       <a:defRPr sz="1800" kern="1200">
         <a:solidFill>
           <a:schemeClr val="tx1"/>
@@ -98,7 +98,7 @@
         <a:cs typeface="+mn-cs"/>
       </a:defRPr>
     </a:lvl8pPr>
-    <a:lvl9pPr marL="3657600" algn="l" defTabSz="914400" rtl="0" eaLnBrk="1" latinLnBrk="0" hangingPunct="1">
+    <a:lvl9pPr marL="3657600" algn="l" defTabSz="457200" rtl="0" eaLnBrk="1" latinLnBrk="0" hangingPunct="1">
       <a:defRPr sz="1800" kern="1200">
         <a:solidFill>
           <a:schemeClr val="tx1"/>
@@ -109,11 +109,16 @@
       </a:defRPr>
     </a:lvl9pPr>
   </p:defaultTextStyle>
+  <p:extLst>
+    <p:ext uri="{EFAFB233-063F-42B5-8137-9DF3F51BA10A}">
+      <p15:sldGuideLst xmlns:p15="http://schemas.microsoft.com/office/powerpoint/2012/main"/>
+    </p:ext>
+  </p:extLst>
 </p:presentation>
 </file>
 
 <file path=ppt/slideLayouts/slideLayout1.xml><?xml version="1.0" encoding="utf-8"?>
-<p:sldLayout xmlns:a="http://schemas.openxmlformats.org/drawingml/2006/main" xmlns:r="http://schemas.openxmlformats.org/officeDocument/2006/relationships" xmlns:p="http://schemas.openxmlformats.org/presentationml/2006/main" type="title" preserve="1">
+<p:sldLayout xmlns:a="http://schemas.openxmlformats.org/drawingml/2006/main" xmlns:r="http://schemas.openxmlformats.org/officeDocument/2006/relationships" xmlns:p="http://schemas.openxmlformats.org/presentationml/2006/main" showMasterSp="0" type="title" preserve="1">
   <p:cSld name="Title Slide">
     <p:spTree>
       <p:nvGrpSpPr>
@@ -131,13 +136,83 @@
       </p:grpSpPr>
       <p:sp>
         <p:nvSpPr>
-          <p:cNvPr id="2" name="Title 1">
-            <a:extLst>
-              <a:ext uri="{FF2B5EF4-FFF2-40B4-BE49-F238E27FC236}">
-                <a16:creationId xmlns:a16="http://schemas.microsoft.com/office/drawing/2014/main" id="{85B87CB0-153B-41D7-82AD-BFDAA3D12828}"/>
-              </a:ext>
-            </a:extLst>
-          </p:cNvPr>
+          <p:cNvPr id="7" name="Rectangle 6"/>
+          <p:cNvSpPr/>
+          <p:nvPr/>
+        </p:nvSpPr>
+        <p:spPr>
+          <a:xfrm>
+            <a:off x="3175" y="6400800"/>
+            <a:ext cx="12188825" cy="457200"/>
+          </a:xfrm>
+          <a:prstGeom prst="rect">
+            <a:avLst/>
+          </a:prstGeom>
+          <a:solidFill>
+            <a:schemeClr val="accent2"/>
+          </a:solidFill>
+          <a:ln>
+            <a:noFill/>
+          </a:ln>
+        </p:spPr>
+        <p:style>
+          <a:lnRef idx="2">
+            <a:schemeClr val="accent1">
+              <a:shade val="50000"/>
+            </a:schemeClr>
+          </a:lnRef>
+          <a:fillRef idx="1">
+            <a:schemeClr val="accent1"/>
+          </a:fillRef>
+          <a:effectRef idx="0">
+            <a:schemeClr val="accent1"/>
+          </a:effectRef>
+          <a:fontRef idx="minor">
+            <a:schemeClr val="lt1"/>
+          </a:fontRef>
+        </p:style>
+      </p:sp>
+      <p:sp>
+        <p:nvSpPr>
+          <p:cNvPr id="8" name="Rectangle 7"/>
+          <p:cNvSpPr/>
+          <p:nvPr/>
+        </p:nvSpPr>
+        <p:spPr>
+          <a:xfrm>
+            <a:off x="15" y="6334316"/>
+            <a:ext cx="12188825" cy="64008"/>
+          </a:xfrm>
+          <a:prstGeom prst="rect">
+            <a:avLst/>
+          </a:prstGeom>
+          <a:solidFill>
+            <a:schemeClr val="accent1"/>
+          </a:solidFill>
+          <a:ln>
+            <a:noFill/>
+          </a:ln>
+        </p:spPr>
+        <p:style>
+          <a:lnRef idx="2">
+            <a:schemeClr val="accent1">
+              <a:shade val="50000"/>
+            </a:schemeClr>
+          </a:lnRef>
+          <a:fillRef idx="1">
+            <a:schemeClr val="accent1"/>
+          </a:fillRef>
+          <a:effectRef idx="0">
+            <a:schemeClr val="accent1"/>
+          </a:effectRef>
+          <a:fontRef idx="minor">
+            <a:schemeClr val="lt1"/>
+          </a:fontRef>
+        </p:style>
+      </p:sp>
+      <p:sp>
+        <p:nvSpPr>
+          <p:cNvPr id="2" name="Title 1"/>
           <p:cNvSpPr>
             <a:spLocks noGrp="1"/>
           </p:cNvSpPr>
@@ -147,15 +222,27 @@
         </p:nvSpPr>
         <p:spPr>
           <a:xfrm>
-            <a:off x="1524000" y="1122363"/>
-            <a:ext cx="9144000" cy="2387600"/>
-          </a:xfrm>
-        </p:spPr>
-        <p:txBody>
-          <a:bodyPr anchor="b"/>
+            <a:off x="1097280" y="758952"/>
+            <a:ext cx="10058400" cy="3566160"/>
+          </a:xfrm>
+        </p:spPr>
+        <p:txBody>
+          <a:bodyPr anchor="b">
+            <a:normAutofit/>
+          </a:bodyPr>
           <a:lstStyle>
-            <a:lvl1pPr algn="ctr">
-              <a:defRPr sz="6000"/>
+            <a:lvl1pPr algn="l">
+              <a:lnSpc>
+                <a:spcPct val="85000"/>
+              </a:lnSpc>
+              <a:defRPr sz="8000" spc="-50" baseline="0">
+                <a:solidFill>
+                  <a:schemeClr val="tx1">
+                    <a:lumMod val="85000"/>
+                    <a:lumOff val="15000"/>
+                  </a:schemeClr>
+                </a:solidFill>
+              </a:defRPr>
             </a:lvl1pPr>
           </a:lstStyle>
           <a:p>
@@ -163,19 +250,13 @@
               <a:rPr lang="en-US"/>
               <a:t>Click to edit Master title style</a:t>
             </a:r>
-            <a:endParaRPr lang="en-GB"/>
-          </a:p>
-        </p:txBody>
-      </p:sp>
-      <p:sp>
-        <p:nvSpPr>
-          <p:cNvPr id="3" name="Subtitle 2">
-            <a:extLst>
-              <a:ext uri="{FF2B5EF4-FFF2-40B4-BE49-F238E27FC236}">
-                <a16:creationId xmlns:a16="http://schemas.microsoft.com/office/drawing/2014/main" id="{AFB1653C-2BD6-4253-B0EE-D0881926A7ED}"/>
-              </a:ext>
-            </a:extLst>
-          </p:cNvPr>
+            <a:endParaRPr lang="en-US" dirty="0"/>
+          </a:p>
+        </p:txBody>
+      </p:sp>
+      <p:sp>
+        <p:nvSpPr>
+          <p:cNvPr id="3" name="Subtitle 2"/>
           <p:cNvSpPr>
             <a:spLocks noGrp="1"/>
           </p:cNvSpPr>
@@ -185,48 +266,55 @@
         </p:nvSpPr>
         <p:spPr>
           <a:xfrm>
-            <a:off x="1524000" y="3602038"/>
-            <a:ext cx="9144000" cy="1655762"/>
-          </a:xfrm>
-        </p:spPr>
-        <p:txBody>
-          <a:bodyPr/>
+            <a:off x="1100051" y="4455620"/>
+            <a:ext cx="10058400" cy="1143000"/>
+          </a:xfrm>
+        </p:spPr>
+        <p:txBody>
+          <a:bodyPr lIns="91440" rIns="91440">
+            <a:normAutofit/>
+          </a:bodyPr>
           <a:lstStyle>
-            <a:lvl1pPr marL="0" indent="0" algn="ctr">
-              <a:buNone/>
-              <a:defRPr sz="2400"/>
+            <a:lvl1pPr marL="0" indent="0" algn="l">
+              <a:buNone/>
+              <a:defRPr sz="2400" cap="all" spc="200" baseline="0">
+                <a:solidFill>
+                  <a:schemeClr val="tx2"/>
+                </a:solidFill>
+                <a:latin typeface="+mj-lt"/>
+              </a:defRPr>
             </a:lvl1pPr>
             <a:lvl2pPr marL="457200" indent="0" algn="ctr">
               <a:buNone/>
-              <a:defRPr sz="2000"/>
+              <a:defRPr sz="2400"/>
             </a:lvl2pPr>
             <a:lvl3pPr marL="914400" indent="0" algn="ctr">
               <a:buNone/>
-              <a:defRPr sz="1800"/>
+              <a:defRPr sz="2400"/>
             </a:lvl3pPr>
             <a:lvl4pPr marL="1371600" indent="0" algn="ctr">
               <a:buNone/>
-              <a:defRPr sz="1600"/>
+              <a:defRPr sz="2000"/>
             </a:lvl4pPr>
             <a:lvl5pPr marL="1828800" indent="0" algn="ctr">
               <a:buNone/>
-              <a:defRPr sz="1600"/>
+              <a:defRPr sz="2000"/>
             </a:lvl5pPr>
             <a:lvl6pPr marL="2286000" indent="0" algn="ctr">
               <a:buNone/>
-              <a:defRPr sz="1600"/>
+              <a:defRPr sz="2000"/>
             </a:lvl6pPr>
             <a:lvl7pPr marL="2743200" indent="0" algn="ctr">
               <a:buNone/>
-              <a:defRPr sz="1600"/>
+              <a:defRPr sz="2000"/>
             </a:lvl7pPr>
             <a:lvl8pPr marL="3200400" indent="0" algn="ctr">
               <a:buNone/>
-              <a:defRPr sz="1600"/>
+              <a:defRPr sz="2000"/>
             </a:lvl8pPr>
             <a:lvl9pPr marL="3657600" indent="0" algn="ctr">
               <a:buNone/>
-              <a:defRPr sz="1600"/>
+              <a:defRPr sz="2000"/>
             </a:lvl9pPr>
           </a:lstStyle>
           <a:p>
@@ -234,19 +322,13 @@
               <a:rPr lang="en-US"/>
               <a:t>Click to edit Master subtitle style</a:t>
             </a:r>
-            <a:endParaRPr lang="en-GB"/>
-          </a:p>
-        </p:txBody>
-      </p:sp>
-      <p:sp>
-        <p:nvSpPr>
-          <p:cNvPr id="4" name="Date Placeholder 3">
-            <a:extLst>
-              <a:ext uri="{FF2B5EF4-FFF2-40B4-BE49-F238E27FC236}">
-                <a16:creationId xmlns:a16="http://schemas.microsoft.com/office/drawing/2014/main" id="{EA9D82C0-73EE-4173-8BDE-1A2800C4A7D0}"/>
-              </a:ext>
-            </a:extLst>
-          </p:cNvPr>
+            <a:endParaRPr lang="en-US" dirty="0"/>
+          </a:p>
+        </p:txBody>
+      </p:sp>
+      <p:sp>
+        <p:nvSpPr>
+          <p:cNvPr id="4" name="Date Placeholder 3"/>
           <p:cNvSpPr>
             <a:spLocks noGrp="1"/>
           </p:cNvSpPr>
@@ -269,13 +351,7 @@
       </p:sp>
       <p:sp>
         <p:nvSpPr>
-          <p:cNvPr id="5" name="Footer Placeholder 4">
-            <a:extLst>
-              <a:ext uri="{FF2B5EF4-FFF2-40B4-BE49-F238E27FC236}">
-                <a16:creationId xmlns:a16="http://schemas.microsoft.com/office/drawing/2014/main" id="{20191F99-4E79-4CE2-B92D-20799236CCAA}"/>
-              </a:ext>
-            </a:extLst>
-          </p:cNvPr>
+          <p:cNvPr id="5" name="Footer Placeholder 4"/>
           <p:cNvSpPr>
             <a:spLocks noGrp="1"/>
           </p:cNvSpPr>
@@ -294,13 +370,7 @@
       </p:sp>
       <p:sp>
         <p:nvSpPr>
-          <p:cNvPr id="6" name="Slide Number Placeholder 5">
-            <a:extLst>
-              <a:ext uri="{FF2B5EF4-FFF2-40B4-BE49-F238E27FC236}">
-                <a16:creationId xmlns:a16="http://schemas.microsoft.com/office/drawing/2014/main" id="{338538E2-5083-4FF9-BDF2-BA4D3BA61591}"/>
-              </a:ext>
-            </a:extLst>
-          </p:cNvPr>
+          <p:cNvPr id="6" name="Slide Number Placeholder 5"/>
           <p:cNvSpPr>
             <a:spLocks noGrp="1"/>
           </p:cNvSpPr>
@@ -321,10 +391,48 @@
           </a:p>
         </p:txBody>
       </p:sp>
+      <p:cxnSp>
+        <p:nvCxnSpPr>
+          <p:cNvPr id="9" name="Straight Connector 8"/>
+          <p:cNvCxnSpPr/>
+          <p:nvPr/>
+        </p:nvCxnSpPr>
+        <p:spPr>
+          <a:xfrm>
+            <a:off x="1207658" y="4343400"/>
+            <a:ext cx="9875520" cy="0"/>
+          </a:xfrm>
+          <a:prstGeom prst="line">
+            <a:avLst/>
+          </a:prstGeom>
+          <a:ln w="6350">
+            <a:solidFill>
+              <a:schemeClr val="tx1">
+                <a:lumMod val="50000"/>
+                <a:lumOff val="50000"/>
+              </a:schemeClr>
+            </a:solidFill>
+          </a:ln>
+        </p:spPr>
+        <p:style>
+          <a:lnRef idx="1">
+            <a:schemeClr val="accent1"/>
+          </a:lnRef>
+          <a:fillRef idx="0">
+            <a:schemeClr val="accent1"/>
+          </a:fillRef>
+          <a:effectRef idx="0">
+            <a:schemeClr val="accent1"/>
+          </a:effectRef>
+          <a:fontRef idx="minor">
+            <a:schemeClr val="tx1"/>
+          </a:fontRef>
+        </p:style>
+      </p:cxnSp>
     </p:spTree>
     <p:extLst>
       <p:ext uri="{BB962C8B-B14F-4D97-AF65-F5344CB8AC3E}">
-        <p14:creationId xmlns:p14="http://schemas.microsoft.com/office/powerpoint/2010/main" val="2425435662"/>
+        <p14:creationId xmlns:p14="http://schemas.microsoft.com/office/powerpoint/2010/main" val="237544827"/>
       </p:ext>
     </p:extLst>
   </p:cSld>
@@ -353,13 +461,7 @@
       </p:grpSpPr>
       <p:sp>
         <p:nvSpPr>
-          <p:cNvPr id="2" name="Title 1">
-            <a:extLst>
-              <a:ext uri="{FF2B5EF4-FFF2-40B4-BE49-F238E27FC236}">
-                <a16:creationId xmlns:a16="http://schemas.microsoft.com/office/drawing/2014/main" id="{1EE7D3FC-2264-432D-88B7-836C6781B315}"/>
-              </a:ext>
-            </a:extLst>
-          </p:cNvPr>
+          <p:cNvPr id="2" name="Title 1"/>
           <p:cNvSpPr>
             <a:spLocks noGrp="1"/>
           </p:cNvSpPr>
@@ -376,19 +478,13 @@
               <a:rPr lang="en-US"/>
               <a:t>Click to edit Master title style</a:t>
             </a:r>
-            <a:endParaRPr lang="en-GB"/>
-          </a:p>
-        </p:txBody>
-      </p:sp>
-      <p:sp>
-        <p:nvSpPr>
-          <p:cNvPr id="3" name="Vertical Text Placeholder 2">
-            <a:extLst>
-              <a:ext uri="{FF2B5EF4-FFF2-40B4-BE49-F238E27FC236}">
-                <a16:creationId xmlns:a16="http://schemas.microsoft.com/office/drawing/2014/main" id="{DEEEAF71-9319-44AA-B336-76F0C5AB1E3D}"/>
-              </a:ext>
-            </a:extLst>
-          </p:cNvPr>
+            <a:endParaRPr lang="en-US" dirty="0"/>
+          </a:p>
+        </p:txBody>
+      </p:sp>
+      <p:sp>
+        <p:nvSpPr>
+          <p:cNvPr id="3" name="Vertical Text Placeholder 2"/>
           <p:cNvSpPr>
             <a:spLocks noGrp="1"/>
           </p:cNvSpPr>
@@ -398,7 +494,7 @@
         </p:nvSpPr>
         <p:spPr/>
         <p:txBody>
-          <a:bodyPr vert="eaVert"/>
+          <a:bodyPr vert="eaVert" lIns="45720" tIns="0" rIns="45720" bIns="0"/>
           <a:lstStyle/>
           <a:p>
             <a:pPr lvl="0"/>
@@ -434,19 +530,13 @@
               <a:rPr lang="en-US"/>
               <a:t>Fifth level</a:t>
             </a:r>
-            <a:endParaRPr lang="en-GB"/>
-          </a:p>
-        </p:txBody>
-      </p:sp>
-      <p:sp>
-        <p:nvSpPr>
-          <p:cNvPr id="4" name="Date Placeholder 3">
-            <a:extLst>
-              <a:ext uri="{FF2B5EF4-FFF2-40B4-BE49-F238E27FC236}">
-                <a16:creationId xmlns:a16="http://schemas.microsoft.com/office/drawing/2014/main" id="{7FEBE913-A336-4D29-926C-CCD968E6EC1B}"/>
-              </a:ext>
-            </a:extLst>
-          </p:cNvPr>
+            <a:endParaRPr lang="en-US" dirty="0"/>
+          </a:p>
+        </p:txBody>
+      </p:sp>
+      <p:sp>
+        <p:nvSpPr>
+          <p:cNvPr id="4" name="Date Placeholder 3"/>
           <p:cNvSpPr>
             <a:spLocks noGrp="1"/>
           </p:cNvSpPr>
@@ -469,13 +559,7 @@
       </p:sp>
       <p:sp>
         <p:nvSpPr>
-          <p:cNvPr id="5" name="Footer Placeholder 4">
-            <a:extLst>
-              <a:ext uri="{FF2B5EF4-FFF2-40B4-BE49-F238E27FC236}">
-                <a16:creationId xmlns:a16="http://schemas.microsoft.com/office/drawing/2014/main" id="{B82BCE70-A1DF-423C-A66B-AE11696A9393}"/>
-              </a:ext>
-            </a:extLst>
-          </p:cNvPr>
+          <p:cNvPr id="5" name="Footer Placeholder 4"/>
           <p:cNvSpPr>
             <a:spLocks noGrp="1"/>
           </p:cNvSpPr>
@@ -494,13 +578,7 @@
       </p:sp>
       <p:sp>
         <p:nvSpPr>
-          <p:cNvPr id="6" name="Slide Number Placeholder 5">
-            <a:extLst>
-              <a:ext uri="{FF2B5EF4-FFF2-40B4-BE49-F238E27FC236}">
-                <a16:creationId xmlns:a16="http://schemas.microsoft.com/office/drawing/2014/main" id="{90C331EE-9BDC-4F01-B90D-0042835D48D7}"/>
-              </a:ext>
-            </a:extLst>
-          </p:cNvPr>
+          <p:cNvPr id="6" name="Slide Number Placeholder 5"/>
           <p:cNvSpPr>
             <a:spLocks noGrp="1"/>
           </p:cNvSpPr>
@@ -524,7 +602,7 @@
     </p:spTree>
     <p:extLst>
       <p:ext uri="{BB962C8B-B14F-4D97-AF65-F5344CB8AC3E}">
-        <p14:creationId xmlns:p14="http://schemas.microsoft.com/office/powerpoint/2010/main" val="1420109526"/>
+        <p14:creationId xmlns:p14="http://schemas.microsoft.com/office/powerpoint/2010/main" val="3886758496"/>
       </p:ext>
     </p:extLst>
   </p:cSld>
@@ -535,7 +613,7 @@
 </file>
 
 <file path=ppt/slideLayouts/slideLayout11.xml><?xml version="1.0" encoding="utf-8"?>
-<p:sldLayout xmlns:a="http://schemas.openxmlformats.org/drawingml/2006/main" xmlns:r="http://schemas.openxmlformats.org/officeDocument/2006/relationships" xmlns:p="http://schemas.openxmlformats.org/presentationml/2006/main" type="vertTitleAndTx" preserve="1">
+<p:sldLayout xmlns:a="http://schemas.openxmlformats.org/drawingml/2006/main" xmlns:r="http://schemas.openxmlformats.org/officeDocument/2006/relationships" xmlns:p="http://schemas.openxmlformats.org/presentationml/2006/main" showMasterSp="0" type="vertTitleAndTx" preserve="1">
   <p:cSld name="Vertical Title and Text">
     <p:spTree>
       <p:nvGrpSpPr>
@@ -553,13 +631,83 @@
       </p:grpSpPr>
       <p:sp>
         <p:nvSpPr>
-          <p:cNvPr id="2" name="Vertical Title 1">
-            <a:extLst>
-              <a:ext uri="{FF2B5EF4-FFF2-40B4-BE49-F238E27FC236}">
-                <a16:creationId xmlns:a16="http://schemas.microsoft.com/office/drawing/2014/main" id="{26DFB4D4-D381-4C7F-A839-7EA535147179}"/>
-              </a:ext>
-            </a:extLst>
-          </p:cNvPr>
+          <p:cNvPr id="7" name="Rectangle 6"/>
+          <p:cNvSpPr/>
+          <p:nvPr/>
+        </p:nvSpPr>
+        <p:spPr>
+          <a:xfrm>
+            <a:off x="3175" y="6400800"/>
+            <a:ext cx="12188825" cy="457200"/>
+          </a:xfrm>
+          <a:prstGeom prst="rect">
+            <a:avLst/>
+          </a:prstGeom>
+          <a:solidFill>
+            <a:schemeClr val="accent2"/>
+          </a:solidFill>
+          <a:ln>
+            <a:noFill/>
+          </a:ln>
+        </p:spPr>
+        <p:style>
+          <a:lnRef idx="2">
+            <a:schemeClr val="accent1">
+              <a:shade val="50000"/>
+            </a:schemeClr>
+          </a:lnRef>
+          <a:fillRef idx="1">
+            <a:schemeClr val="accent1"/>
+          </a:fillRef>
+          <a:effectRef idx="0">
+            <a:schemeClr val="accent1"/>
+          </a:effectRef>
+          <a:fontRef idx="minor">
+            <a:schemeClr val="lt1"/>
+          </a:fontRef>
+        </p:style>
+      </p:sp>
+      <p:sp>
+        <p:nvSpPr>
+          <p:cNvPr id="8" name="Rectangle 7"/>
+          <p:cNvSpPr/>
+          <p:nvPr/>
+        </p:nvSpPr>
+        <p:spPr>
+          <a:xfrm>
+            <a:off x="15" y="6334316"/>
+            <a:ext cx="12188825" cy="64008"/>
+          </a:xfrm>
+          <a:prstGeom prst="rect">
+            <a:avLst/>
+          </a:prstGeom>
+          <a:solidFill>
+            <a:schemeClr val="accent1"/>
+          </a:solidFill>
+          <a:ln>
+            <a:noFill/>
+          </a:ln>
+        </p:spPr>
+        <p:style>
+          <a:lnRef idx="2">
+            <a:schemeClr val="accent1">
+              <a:shade val="50000"/>
+            </a:schemeClr>
+          </a:lnRef>
+          <a:fillRef idx="1">
+            <a:schemeClr val="accent1"/>
+          </a:fillRef>
+          <a:effectRef idx="0">
+            <a:schemeClr val="accent1"/>
+          </a:effectRef>
+          <a:fontRef idx="minor">
+            <a:schemeClr val="lt1"/>
+          </a:fontRef>
+        </p:style>
+      </p:sp>
+      <p:sp>
+        <p:nvSpPr>
+          <p:cNvPr id="2" name="Vertical Title 1"/>
           <p:cNvSpPr>
             <a:spLocks noGrp="1"/>
           </p:cNvSpPr>
@@ -569,8 +717,8 @@
         </p:nvSpPr>
         <p:spPr>
           <a:xfrm>
-            <a:off x="8724900" y="365125"/>
-            <a:ext cx="2628900" cy="5811838"/>
+            <a:off x="8724900" y="414778"/>
+            <a:ext cx="2628900" cy="5757421"/>
           </a:xfrm>
         </p:spPr>
         <p:txBody>
@@ -581,19 +729,13 @@
               <a:rPr lang="en-US"/>
               <a:t>Click to edit Master title style</a:t>
             </a:r>
-            <a:endParaRPr lang="en-GB"/>
-          </a:p>
-        </p:txBody>
-      </p:sp>
-      <p:sp>
-        <p:nvSpPr>
-          <p:cNvPr id="3" name="Vertical Text Placeholder 2">
-            <a:extLst>
-              <a:ext uri="{FF2B5EF4-FFF2-40B4-BE49-F238E27FC236}">
-                <a16:creationId xmlns:a16="http://schemas.microsoft.com/office/drawing/2014/main" id="{D2EEDF27-F8D7-47D0-B75C-898B689AD2E8}"/>
-              </a:ext>
-            </a:extLst>
-          </p:cNvPr>
+            <a:endParaRPr lang="en-US" dirty="0"/>
+          </a:p>
+        </p:txBody>
+      </p:sp>
+      <p:sp>
+        <p:nvSpPr>
+          <p:cNvPr id="3" name="Vertical Text Placeholder 2"/>
           <p:cNvSpPr>
             <a:spLocks noGrp="1"/>
           </p:cNvSpPr>
@@ -603,12 +745,12 @@
         </p:nvSpPr>
         <p:spPr>
           <a:xfrm>
-            <a:off x="838200" y="365125"/>
-            <a:ext cx="7734300" cy="5811838"/>
-          </a:xfrm>
-        </p:spPr>
-        <p:txBody>
-          <a:bodyPr vert="eaVert"/>
+            <a:off x="838200" y="414778"/>
+            <a:ext cx="7734300" cy="5757422"/>
+          </a:xfrm>
+        </p:spPr>
+        <p:txBody>
+          <a:bodyPr vert="eaVert" lIns="45720" tIns="0" rIns="45720" bIns="0"/>
           <a:lstStyle/>
           <a:p>
             <a:pPr lvl="0"/>
@@ -644,19 +786,13 @@
               <a:rPr lang="en-US"/>
               <a:t>Fifth level</a:t>
             </a:r>
-            <a:endParaRPr lang="en-GB"/>
-          </a:p>
-        </p:txBody>
-      </p:sp>
-      <p:sp>
-        <p:nvSpPr>
-          <p:cNvPr id="4" name="Date Placeholder 3">
-            <a:extLst>
-              <a:ext uri="{FF2B5EF4-FFF2-40B4-BE49-F238E27FC236}">
-                <a16:creationId xmlns:a16="http://schemas.microsoft.com/office/drawing/2014/main" id="{5EE3AAFE-DBF9-431A-AC29-C86D25FFF479}"/>
-              </a:ext>
-            </a:extLst>
-          </p:cNvPr>
+            <a:endParaRPr lang="en-US" dirty="0"/>
+          </a:p>
+        </p:txBody>
+      </p:sp>
+      <p:sp>
+        <p:nvSpPr>
+          <p:cNvPr id="4" name="Date Placeholder 3"/>
           <p:cNvSpPr>
             <a:spLocks noGrp="1"/>
           </p:cNvSpPr>
@@ -679,13 +815,7 @@
       </p:sp>
       <p:sp>
         <p:nvSpPr>
-          <p:cNvPr id="5" name="Footer Placeholder 4">
-            <a:extLst>
-              <a:ext uri="{FF2B5EF4-FFF2-40B4-BE49-F238E27FC236}">
-                <a16:creationId xmlns:a16="http://schemas.microsoft.com/office/drawing/2014/main" id="{583364D1-E903-4F0C-B748-60DDF6CAFA8D}"/>
-              </a:ext>
-            </a:extLst>
-          </p:cNvPr>
+          <p:cNvPr id="5" name="Footer Placeholder 4"/>
           <p:cNvSpPr>
             <a:spLocks noGrp="1"/>
           </p:cNvSpPr>
@@ -704,13 +834,7 @@
       </p:sp>
       <p:sp>
         <p:nvSpPr>
-          <p:cNvPr id="6" name="Slide Number Placeholder 5">
-            <a:extLst>
-              <a:ext uri="{FF2B5EF4-FFF2-40B4-BE49-F238E27FC236}">
-                <a16:creationId xmlns:a16="http://schemas.microsoft.com/office/drawing/2014/main" id="{78FCF2A8-AADE-4E62-8A99-0CF763E16EE2}"/>
-              </a:ext>
-            </a:extLst>
-          </p:cNvPr>
+          <p:cNvPr id="6" name="Slide Number Placeholder 5"/>
           <p:cNvSpPr>
             <a:spLocks noGrp="1"/>
           </p:cNvSpPr>
@@ -734,7 +858,7 @@
     </p:spTree>
     <p:extLst>
       <p:ext uri="{BB962C8B-B14F-4D97-AF65-F5344CB8AC3E}">
-        <p14:creationId xmlns:p14="http://schemas.microsoft.com/office/powerpoint/2010/main" val="4227291163"/>
+        <p14:creationId xmlns:p14="http://schemas.microsoft.com/office/powerpoint/2010/main" val="3400854742"/>
       </p:ext>
     </p:extLst>
   </p:cSld>
@@ -763,18 +887,39 @@
       </p:grpSpPr>
       <p:sp>
         <p:nvSpPr>
-          <p:cNvPr id="2" name="Title 1">
-            <a:extLst>
-              <a:ext uri="{FF2B5EF4-FFF2-40B4-BE49-F238E27FC236}">
-                <a16:creationId xmlns:a16="http://schemas.microsoft.com/office/drawing/2014/main" id="{62C9B875-E2F7-4999-A7D1-D735F2BE05CB}"/>
-              </a:ext>
-            </a:extLst>
-          </p:cNvPr>
+          <p:cNvPr id="2" name="Title 1"/>
           <p:cNvSpPr>
             <a:spLocks noGrp="1"/>
           </p:cNvSpPr>
           <p:nvPr>
             <p:ph type="title"/>
+          </p:nvPr>
+        </p:nvSpPr>
+        <p:spPr/>
+        <p:txBody>
+          <a:bodyPr/>
+          <a:lstStyle>
+            <a:lvl1pPr marL="0">
+              <a:defRPr/>
+            </a:lvl1pPr>
+          </a:lstStyle>
+          <a:p>
+            <a:r>
+              <a:rPr lang="en-US"/>
+              <a:t>Click to edit Master title style</a:t>
+            </a:r>
+            <a:endParaRPr lang="en-US" dirty="0"/>
+          </a:p>
+        </p:txBody>
+      </p:sp>
+      <p:sp>
+        <p:nvSpPr>
+          <p:cNvPr id="3" name="Content Placeholder 2"/>
+          <p:cNvSpPr>
+            <a:spLocks noGrp="1"/>
+          </p:cNvSpPr>
+          <p:nvPr>
+            <p:ph idx="1"/>
           </p:nvPr>
         </p:nvSpPr>
         <p:spPr/>
@@ -782,35 +927,6 @@
           <a:bodyPr/>
           <a:lstStyle/>
           <a:p>
-            <a:r>
-              <a:rPr lang="en-US"/>
-              <a:t>Click to edit Master title style</a:t>
-            </a:r>
-            <a:endParaRPr lang="en-GB"/>
-          </a:p>
-        </p:txBody>
-      </p:sp>
-      <p:sp>
-        <p:nvSpPr>
-          <p:cNvPr id="3" name="Content Placeholder 2">
-            <a:extLst>
-              <a:ext uri="{FF2B5EF4-FFF2-40B4-BE49-F238E27FC236}">
-                <a16:creationId xmlns:a16="http://schemas.microsoft.com/office/drawing/2014/main" id="{93045DFC-D51A-43EB-925A-497D008AF5CE}"/>
-              </a:ext>
-            </a:extLst>
-          </p:cNvPr>
-          <p:cNvSpPr>
-            <a:spLocks noGrp="1"/>
-          </p:cNvSpPr>
-          <p:nvPr>
-            <p:ph idx="1"/>
-          </p:nvPr>
-        </p:nvSpPr>
-        <p:spPr/>
-        <p:txBody>
-          <a:bodyPr/>
-          <a:lstStyle/>
-          <a:p>
             <a:pPr lvl="0"/>
             <a:r>
               <a:rPr lang="en-US"/>
@@ -844,19 +960,13 @@
               <a:rPr lang="en-US"/>
               <a:t>Fifth level</a:t>
             </a:r>
-            <a:endParaRPr lang="en-GB"/>
-          </a:p>
-        </p:txBody>
-      </p:sp>
-      <p:sp>
-        <p:nvSpPr>
-          <p:cNvPr id="4" name="Date Placeholder 3">
-            <a:extLst>
-              <a:ext uri="{FF2B5EF4-FFF2-40B4-BE49-F238E27FC236}">
-                <a16:creationId xmlns:a16="http://schemas.microsoft.com/office/drawing/2014/main" id="{59D52DCF-99D3-4803-9372-1F28174D5B73}"/>
-              </a:ext>
-            </a:extLst>
-          </p:cNvPr>
+            <a:endParaRPr lang="en-US" dirty="0"/>
+          </a:p>
+        </p:txBody>
+      </p:sp>
+      <p:sp>
+        <p:nvSpPr>
+          <p:cNvPr id="4" name="Date Placeholder 3"/>
           <p:cNvSpPr>
             <a:spLocks noGrp="1"/>
           </p:cNvSpPr>
@@ -879,13 +989,7 @@
       </p:sp>
       <p:sp>
         <p:nvSpPr>
-          <p:cNvPr id="5" name="Footer Placeholder 4">
-            <a:extLst>
-              <a:ext uri="{FF2B5EF4-FFF2-40B4-BE49-F238E27FC236}">
-                <a16:creationId xmlns:a16="http://schemas.microsoft.com/office/drawing/2014/main" id="{B5645773-A378-4BAF-A884-B2EC8546BBC1}"/>
-              </a:ext>
-            </a:extLst>
-          </p:cNvPr>
+          <p:cNvPr id="5" name="Footer Placeholder 4"/>
           <p:cNvSpPr>
             <a:spLocks noGrp="1"/>
           </p:cNvSpPr>
@@ -904,13 +1008,7 @@
       </p:sp>
       <p:sp>
         <p:nvSpPr>
-          <p:cNvPr id="6" name="Slide Number Placeholder 5">
-            <a:extLst>
-              <a:ext uri="{FF2B5EF4-FFF2-40B4-BE49-F238E27FC236}">
-                <a16:creationId xmlns:a16="http://schemas.microsoft.com/office/drawing/2014/main" id="{49F99F06-D030-4F10-8284-41A02D4BB88A}"/>
-              </a:ext>
-            </a:extLst>
-          </p:cNvPr>
+          <p:cNvPr id="6" name="Slide Number Placeholder 5"/>
           <p:cNvSpPr>
             <a:spLocks noGrp="1"/>
           </p:cNvSpPr>
@@ -934,7 +1032,7 @@
     </p:spTree>
     <p:extLst>
       <p:ext uri="{BB962C8B-B14F-4D97-AF65-F5344CB8AC3E}">
-        <p14:creationId xmlns:p14="http://schemas.microsoft.com/office/powerpoint/2010/main" val="3301430177"/>
+        <p14:creationId xmlns:p14="http://schemas.microsoft.com/office/powerpoint/2010/main" val="3656032691"/>
       </p:ext>
     </p:extLst>
   </p:cSld>
@@ -945,8 +1043,16 @@
 </file>
 
 <file path=ppt/slideLayouts/slideLayout3.xml><?xml version="1.0" encoding="utf-8"?>
-<p:sldLayout xmlns:a="http://schemas.openxmlformats.org/drawingml/2006/main" xmlns:r="http://schemas.openxmlformats.org/officeDocument/2006/relationships" xmlns:p="http://schemas.openxmlformats.org/presentationml/2006/main" type="secHead" preserve="1">
+<p:sldLayout xmlns:a="http://schemas.openxmlformats.org/drawingml/2006/main" xmlns:r="http://schemas.openxmlformats.org/officeDocument/2006/relationships" xmlns:p="http://schemas.openxmlformats.org/presentationml/2006/main" showMasterSp="0" type="secHead" preserve="1">
   <p:cSld name="Section Header">
+    <p:bg>
+      <p:bgPr>
+        <a:solidFill>
+          <a:schemeClr val="bg1"/>
+        </a:solidFill>
+        <a:effectLst/>
+      </p:bgPr>
+    </p:bg>
     <p:spTree>
       <p:nvGrpSpPr>
         <p:cNvPr id="1" name=""/>
@@ -963,13 +1069,83 @@
       </p:grpSpPr>
       <p:sp>
         <p:nvSpPr>
-          <p:cNvPr id="2" name="Title 1">
-            <a:extLst>
-              <a:ext uri="{FF2B5EF4-FFF2-40B4-BE49-F238E27FC236}">
-                <a16:creationId xmlns:a16="http://schemas.microsoft.com/office/drawing/2014/main" id="{ACBB52B9-20E4-46E1-8398-7DF35B9DDC64}"/>
-              </a:ext>
-            </a:extLst>
-          </p:cNvPr>
+          <p:cNvPr id="7" name="Rectangle 6"/>
+          <p:cNvSpPr/>
+          <p:nvPr/>
+        </p:nvSpPr>
+        <p:spPr>
+          <a:xfrm>
+            <a:off x="3175" y="6400800"/>
+            <a:ext cx="12188825" cy="457200"/>
+          </a:xfrm>
+          <a:prstGeom prst="rect">
+            <a:avLst/>
+          </a:prstGeom>
+          <a:solidFill>
+            <a:schemeClr val="accent2"/>
+          </a:solidFill>
+          <a:ln>
+            <a:noFill/>
+          </a:ln>
+        </p:spPr>
+        <p:style>
+          <a:lnRef idx="2">
+            <a:schemeClr val="accent1">
+              <a:shade val="50000"/>
+            </a:schemeClr>
+          </a:lnRef>
+          <a:fillRef idx="1">
+            <a:schemeClr val="accent1"/>
+          </a:fillRef>
+          <a:effectRef idx="0">
+            <a:schemeClr val="accent1"/>
+          </a:effectRef>
+          <a:fontRef idx="minor">
+            <a:schemeClr val="lt1"/>
+          </a:fontRef>
+        </p:style>
+      </p:sp>
+      <p:sp>
+        <p:nvSpPr>
+          <p:cNvPr id="8" name="Rectangle 7"/>
+          <p:cNvSpPr/>
+          <p:nvPr/>
+        </p:nvSpPr>
+        <p:spPr>
+          <a:xfrm>
+            <a:off x="15" y="6334316"/>
+            <a:ext cx="12188825" cy="64008"/>
+          </a:xfrm>
+          <a:prstGeom prst="rect">
+            <a:avLst/>
+          </a:prstGeom>
+          <a:solidFill>
+            <a:schemeClr val="accent1"/>
+          </a:solidFill>
+          <a:ln>
+            <a:noFill/>
+          </a:ln>
+        </p:spPr>
+        <p:style>
+          <a:lnRef idx="2">
+            <a:schemeClr val="accent1">
+              <a:shade val="50000"/>
+            </a:schemeClr>
+          </a:lnRef>
+          <a:fillRef idx="1">
+            <a:schemeClr val="accent1"/>
+          </a:fillRef>
+          <a:effectRef idx="0">
+            <a:schemeClr val="accent1"/>
+          </a:effectRef>
+          <a:fontRef idx="minor">
+            <a:schemeClr val="lt1"/>
+          </a:fontRef>
+        </p:style>
+      </p:sp>
+      <p:sp>
+        <p:nvSpPr>
+          <p:cNvPr id="2" name="Title 1"/>
           <p:cNvSpPr>
             <a:spLocks noGrp="1"/>
           </p:cNvSpPr>
@@ -979,64 +1155,71 @@
         </p:nvSpPr>
         <p:spPr>
           <a:xfrm>
-            <a:off x="831850" y="1709738"/>
-            <a:ext cx="10515600" cy="2852737"/>
-          </a:xfrm>
-        </p:spPr>
-        <p:txBody>
-          <a:bodyPr anchor="b"/>
+            <a:off x="1097280" y="758952"/>
+            <a:ext cx="10058400" cy="3566160"/>
+          </a:xfrm>
+        </p:spPr>
+        <p:txBody>
+          <a:bodyPr anchor="b" anchorCtr="0">
+            <a:normAutofit/>
+          </a:bodyPr>
           <a:lstStyle>
             <a:lvl1pPr>
-              <a:defRPr sz="6000"/>
-            </a:lvl1pPr>
-          </a:lstStyle>
-          <a:p>
-            <a:r>
-              <a:rPr lang="en-US"/>
-              <a:t>Click to edit Master title style</a:t>
-            </a:r>
-            <a:endParaRPr lang="en-GB"/>
-          </a:p>
-        </p:txBody>
-      </p:sp>
-      <p:sp>
-        <p:nvSpPr>
-          <p:cNvPr id="3" name="Text Placeholder 2">
-            <a:extLst>
-              <a:ext uri="{FF2B5EF4-FFF2-40B4-BE49-F238E27FC236}">
-                <a16:creationId xmlns:a16="http://schemas.microsoft.com/office/drawing/2014/main" id="{1ABF702F-E293-4385-B60D-881A5E798B6F}"/>
-              </a:ext>
-            </a:extLst>
-          </p:cNvPr>
-          <p:cNvSpPr>
-            <a:spLocks noGrp="1"/>
-          </p:cNvSpPr>
-          <p:nvPr>
-            <p:ph type="body" idx="1"/>
-          </p:nvPr>
-        </p:nvSpPr>
-        <p:spPr>
-          <a:xfrm>
-            <a:off x="831850" y="4589463"/>
-            <a:ext cx="10515600" cy="1500187"/>
-          </a:xfrm>
-        </p:spPr>
-        <p:txBody>
-          <a:bodyPr/>
-          <a:lstStyle>
-            <a:lvl1pPr marL="0" indent="0">
-              <a:buNone/>
-              <a:defRPr sz="2400">
+              <a:lnSpc>
+                <a:spcPct val="85000"/>
+              </a:lnSpc>
+              <a:defRPr sz="8000" b="0">
                 <a:solidFill>
                   <a:schemeClr val="tx1">
-                    <a:tint val="75000"/>
+                    <a:lumMod val="85000"/>
+                    <a:lumOff val="15000"/>
                   </a:schemeClr>
                 </a:solidFill>
               </a:defRPr>
             </a:lvl1pPr>
+          </a:lstStyle>
+          <a:p>
+            <a:r>
+              <a:rPr lang="en-US"/>
+              <a:t>Click to edit Master title style</a:t>
+            </a:r>
+            <a:endParaRPr lang="en-US" dirty="0"/>
+          </a:p>
+        </p:txBody>
+      </p:sp>
+      <p:sp>
+        <p:nvSpPr>
+          <p:cNvPr id="3" name="Text Placeholder 2"/>
+          <p:cNvSpPr>
+            <a:spLocks noGrp="1"/>
+          </p:cNvSpPr>
+          <p:nvPr>
+            <p:ph type="body" idx="1"/>
+          </p:nvPr>
+        </p:nvSpPr>
+        <p:spPr>
+          <a:xfrm>
+            <a:off x="1097280" y="4453128"/>
+            <a:ext cx="10058400" cy="1143000"/>
+          </a:xfrm>
+        </p:spPr>
+        <p:txBody>
+          <a:bodyPr lIns="91440" rIns="91440" anchor="t" anchorCtr="0">
+            <a:normAutofit/>
+          </a:bodyPr>
+          <a:lstStyle>
+            <a:lvl1pPr marL="0" indent="0">
+              <a:buNone/>
+              <a:defRPr sz="2400" cap="all" spc="200" baseline="0">
+                <a:solidFill>
+                  <a:schemeClr val="tx2"/>
+                </a:solidFill>
+                <a:latin typeface="+mj-lt"/>
+              </a:defRPr>
+            </a:lvl1pPr>
             <a:lvl2pPr marL="457200" indent="0">
               <a:buNone/>
-              <a:defRPr sz="2000">
+              <a:defRPr sz="1800">
                 <a:solidFill>
                   <a:schemeClr val="tx1">
                     <a:tint val="75000"/>
@@ -1046,7 +1229,7 @@
             </a:lvl2pPr>
             <a:lvl3pPr marL="914400" indent="0">
               <a:buNone/>
-              <a:defRPr sz="1800">
+              <a:defRPr sz="1600">
                 <a:solidFill>
                   <a:schemeClr val="tx1">
                     <a:tint val="75000"/>
@@ -1056,7 +1239,7 @@
             </a:lvl3pPr>
             <a:lvl4pPr marL="1371600" indent="0">
               <a:buNone/>
-              <a:defRPr sz="1600">
+              <a:defRPr sz="1400">
                 <a:solidFill>
                   <a:schemeClr val="tx1">
                     <a:tint val="75000"/>
@@ -1066,7 +1249,7 @@
             </a:lvl4pPr>
             <a:lvl5pPr marL="1828800" indent="0">
               <a:buNone/>
-              <a:defRPr sz="1600">
+              <a:defRPr sz="1400">
                 <a:solidFill>
                   <a:schemeClr val="tx1">
                     <a:tint val="75000"/>
@@ -1076,7 +1259,7 @@
             </a:lvl5pPr>
             <a:lvl6pPr marL="2286000" indent="0">
               <a:buNone/>
-              <a:defRPr sz="1600">
+              <a:defRPr sz="1400">
                 <a:solidFill>
                   <a:schemeClr val="tx1">
                     <a:tint val="75000"/>
@@ -1086,7 +1269,7 @@
             </a:lvl6pPr>
             <a:lvl7pPr marL="2743200" indent="0">
               <a:buNone/>
-              <a:defRPr sz="1600">
+              <a:defRPr sz="1400">
                 <a:solidFill>
                   <a:schemeClr val="tx1">
                     <a:tint val="75000"/>
@@ -1096,7 +1279,7 @@
             </a:lvl7pPr>
             <a:lvl8pPr marL="3200400" indent="0">
               <a:buNone/>
-              <a:defRPr sz="1600">
+              <a:defRPr sz="1400">
                 <a:solidFill>
                   <a:schemeClr val="tx1">
                     <a:tint val="75000"/>
@@ -1106,7 +1289,7 @@
             </a:lvl8pPr>
             <a:lvl9pPr marL="3657600" indent="0">
               <a:buNone/>
-              <a:defRPr sz="1600">
+              <a:defRPr sz="1400">
                 <a:solidFill>
                   <a:schemeClr val="tx1">
                     <a:tint val="75000"/>
@@ -1126,13 +1309,7 @@
       </p:sp>
       <p:sp>
         <p:nvSpPr>
-          <p:cNvPr id="4" name="Date Placeholder 3">
-            <a:extLst>
-              <a:ext uri="{FF2B5EF4-FFF2-40B4-BE49-F238E27FC236}">
-                <a16:creationId xmlns:a16="http://schemas.microsoft.com/office/drawing/2014/main" id="{15F8BA50-0D92-40C4-9BC9-1B466E0A9885}"/>
-              </a:ext>
-            </a:extLst>
-          </p:cNvPr>
+          <p:cNvPr id="4" name="Date Placeholder 3"/>
           <p:cNvSpPr>
             <a:spLocks noGrp="1"/>
           </p:cNvSpPr>
@@ -1155,13 +1332,7 @@
       </p:sp>
       <p:sp>
         <p:nvSpPr>
-          <p:cNvPr id="5" name="Footer Placeholder 4">
-            <a:extLst>
-              <a:ext uri="{FF2B5EF4-FFF2-40B4-BE49-F238E27FC236}">
-                <a16:creationId xmlns:a16="http://schemas.microsoft.com/office/drawing/2014/main" id="{831FD5CA-D343-40CE-8121-C362FA6B5070}"/>
-              </a:ext>
-            </a:extLst>
-          </p:cNvPr>
+          <p:cNvPr id="5" name="Footer Placeholder 4"/>
           <p:cNvSpPr>
             <a:spLocks noGrp="1"/>
           </p:cNvSpPr>
@@ -1180,13 +1351,7 @@
       </p:sp>
       <p:sp>
         <p:nvSpPr>
-          <p:cNvPr id="6" name="Slide Number Placeholder 5">
-            <a:extLst>
-              <a:ext uri="{FF2B5EF4-FFF2-40B4-BE49-F238E27FC236}">
-                <a16:creationId xmlns:a16="http://schemas.microsoft.com/office/drawing/2014/main" id="{0115087F-ABC6-4859-B9B9-2C56549AA5BA}"/>
-              </a:ext>
-            </a:extLst>
-          </p:cNvPr>
+          <p:cNvPr id="6" name="Slide Number Placeholder 5"/>
           <p:cNvSpPr>
             <a:spLocks noGrp="1"/>
           </p:cNvSpPr>
@@ -1207,10 +1372,48 @@
           </a:p>
         </p:txBody>
       </p:sp>
+      <p:cxnSp>
+        <p:nvCxnSpPr>
+          <p:cNvPr id="9" name="Straight Connector 8"/>
+          <p:cNvCxnSpPr/>
+          <p:nvPr/>
+        </p:nvCxnSpPr>
+        <p:spPr>
+          <a:xfrm>
+            <a:off x="1207658" y="4343400"/>
+            <a:ext cx="9875520" cy="0"/>
+          </a:xfrm>
+          <a:prstGeom prst="line">
+            <a:avLst/>
+          </a:prstGeom>
+          <a:ln w="6350">
+            <a:solidFill>
+              <a:schemeClr val="tx1">
+                <a:lumMod val="50000"/>
+                <a:lumOff val="50000"/>
+              </a:schemeClr>
+            </a:solidFill>
+          </a:ln>
+        </p:spPr>
+        <p:style>
+          <a:lnRef idx="1">
+            <a:schemeClr val="accent1"/>
+          </a:lnRef>
+          <a:fillRef idx="0">
+            <a:schemeClr val="accent1"/>
+          </a:fillRef>
+          <a:effectRef idx="0">
+            <a:schemeClr val="accent1"/>
+          </a:effectRef>
+          <a:fontRef idx="minor">
+            <a:schemeClr val="tx1"/>
+          </a:fontRef>
+        </p:style>
+      </p:cxnSp>
     </p:spTree>
     <p:extLst>
       <p:ext uri="{BB962C8B-B14F-4D97-AF65-F5344CB8AC3E}">
-        <p14:creationId xmlns:p14="http://schemas.microsoft.com/office/powerpoint/2010/main" val="4237416552"/>
+        <p14:creationId xmlns:p14="http://schemas.microsoft.com/office/powerpoint/2010/main" val="2962310368"/>
       </p:ext>
     </p:extLst>
   </p:cSld>
@@ -1239,13 +1442,7 @@
       </p:grpSpPr>
       <p:sp>
         <p:nvSpPr>
-          <p:cNvPr id="2" name="Title 1">
-            <a:extLst>
-              <a:ext uri="{FF2B5EF4-FFF2-40B4-BE49-F238E27FC236}">
-                <a16:creationId xmlns:a16="http://schemas.microsoft.com/office/drawing/2014/main" id="{5E96DE06-181A-497B-AA73-1866F62E8052}"/>
-              </a:ext>
-            </a:extLst>
-          </p:cNvPr>
+          <p:cNvPr id="8" name="Title 7"/>
           <p:cNvSpPr>
             <a:spLocks noGrp="1"/>
           </p:cNvSpPr>
@@ -1253,7 +1450,12 @@
             <p:ph type="title"/>
           </p:nvPr>
         </p:nvSpPr>
-        <p:spPr/>
+        <p:spPr>
+          <a:xfrm>
+            <a:off x="1097280" y="286603"/>
+            <a:ext cx="10058400" cy="1450757"/>
+          </a:xfrm>
+        </p:spPr>
         <p:txBody>
           <a:bodyPr/>
           <a:lstStyle/>
@@ -1262,19 +1464,13 @@
               <a:rPr lang="en-US"/>
               <a:t>Click to edit Master title style</a:t>
             </a:r>
-            <a:endParaRPr lang="en-GB"/>
-          </a:p>
-        </p:txBody>
-      </p:sp>
-      <p:sp>
-        <p:nvSpPr>
-          <p:cNvPr id="3" name="Content Placeholder 2">
-            <a:extLst>
-              <a:ext uri="{FF2B5EF4-FFF2-40B4-BE49-F238E27FC236}">
-                <a16:creationId xmlns:a16="http://schemas.microsoft.com/office/drawing/2014/main" id="{991471C2-C6F3-426B-AAC3-09C7B81E0741}"/>
-              </a:ext>
-            </a:extLst>
-          </p:cNvPr>
+            <a:endParaRPr lang="en-US" dirty="0"/>
+          </a:p>
+        </p:txBody>
+      </p:sp>
+      <p:sp>
+        <p:nvSpPr>
+          <p:cNvPr id="3" name="Content Placeholder 2"/>
           <p:cNvSpPr>
             <a:spLocks noGrp="1"/>
           </p:cNvSpPr>
@@ -1284,8 +1480,8 @@
         </p:nvSpPr>
         <p:spPr>
           <a:xfrm>
-            <a:off x="838200" y="1825625"/>
-            <a:ext cx="5181600" cy="4351338"/>
+            <a:off x="1097279" y="1845734"/>
+            <a:ext cx="4937760" cy="4023360"/>
           </a:xfrm>
         </p:spPr>
         <p:txBody>
@@ -1325,19 +1521,13 @@
               <a:rPr lang="en-US"/>
               <a:t>Fifth level</a:t>
             </a:r>
-            <a:endParaRPr lang="en-GB"/>
-          </a:p>
-        </p:txBody>
-      </p:sp>
-      <p:sp>
-        <p:nvSpPr>
-          <p:cNvPr id="4" name="Content Placeholder 3">
-            <a:extLst>
-              <a:ext uri="{FF2B5EF4-FFF2-40B4-BE49-F238E27FC236}">
-                <a16:creationId xmlns:a16="http://schemas.microsoft.com/office/drawing/2014/main" id="{E6525B84-D761-4D6F-9D7E-F07CCCE764EB}"/>
-              </a:ext>
-            </a:extLst>
-          </p:cNvPr>
+            <a:endParaRPr lang="en-US" dirty="0"/>
+          </a:p>
+        </p:txBody>
+      </p:sp>
+      <p:sp>
+        <p:nvSpPr>
+          <p:cNvPr id="4" name="Content Placeholder 3"/>
           <p:cNvSpPr>
             <a:spLocks noGrp="1"/>
           </p:cNvSpPr>
@@ -1347,8 +1537,8 @@
         </p:nvSpPr>
         <p:spPr>
           <a:xfrm>
-            <a:off x="6172200" y="1825625"/>
-            <a:ext cx="5181600" cy="4351338"/>
+            <a:off x="6217920" y="1845735"/>
+            <a:ext cx="4937760" cy="4023360"/>
           </a:xfrm>
         </p:spPr>
         <p:txBody>
@@ -1388,19 +1578,13 @@
               <a:rPr lang="en-US"/>
               <a:t>Fifth level</a:t>
             </a:r>
-            <a:endParaRPr lang="en-GB"/>
-          </a:p>
-        </p:txBody>
-      </p:sp>
-      <p:sp>
-        <p:nvSpPr>
-          <p:cNvPr id="5" name="Date Placeholder 4">
-            <a:extLst>
-              <a:ext uri="{FF2B5EF4-FFF2-40B4-BE49-F238E27FC236}">
-                <a16:creationId xmlns:a16="http://schemas.microsoft.com/office/drawing/2014/main" id="{C31454FC-8997-4474-A2E3-DD5AE7AE07C2}"/>
-              </a:ext>
-            </a:extLst>
-          </p:cNvPr>
+            <a:endParaRPr lang="en-US" dirty="0"/>
+          </a:p>
+        </p:txBody>
+      </p:sp>
+      <p:sp>
+        <p:nvSpPr>
+          <p:cNvPr id="5" name="Date Placeholder 4"/>
           <p:cNvSpPr>
             <a:spLocks noGrp="1"/>
           </p:cNvSpPr>
@@ -1423,13 +1607,7 @@
       </p:sp>
       <p:sp>
         <p:nvSpPr>
-          <p:cNvPr id="6" name="Footer Placeholder 5">
-            <a:extLst>
-              <a:ext uri="{FF2B5EF4-FFF2-40B4-BE49-F238E27FC236}">
-                <a16:creationId xmlns:a16="http://schemas.microsoft.com/office/drawing/2014/main" id="{42987E89-F8DC-421E-986D-039B644F9FF4}"/>
-              </a:ext>
-            </a:extLst>
-          </p:cNvPr>
+          <p:cNvPr id="6" name="Footer Placeholder 5"/>
           <p:cNvSpPr>
             <a:spLocks noGrp="1"/>
           </p:cNvSpPr>
@@ -1448,13 +1626,7 @@
       </p:sp>
       <p:sp>
         <p:nvSpPr>
-          <p:cNvPr id="7" name="Slide Number Placeholder 6">
-            <a:extLst>
-              <a:ext uri="{FF2B5EF4-FFF2-40B4-BE49-F238E27FC236}">
-                <a16:creationId xmlns:a16="http://schemas.microsoft.com/office/drawing/2014/main" id="{668086B5-9EDD-4196-BBED-0EC12583578A}"/>
-              </a:ext>
-            </a:extLst>
-          </p:cNvPr>
+          <p:cNvPr id="7" name="Slide Number Placeholder 6"/>
           <p:cNvSpPr>
             <a:spLocks noGrp="1"/>
           </p:cNvSpPr>
@@ -1478,7 +1650,7 @@
     </p:spTree>
     <p:extLst>
       <p:ext uri="{BB962C8B-B14F-4D97-AF65-F5344CB8AC3E}">
-        <p14:creationId xmlns:p14="http://schemas.microsoft.com/office/powerpoint/2010/main" val="4041384152"/>
+        <p14:creationId xmlns:p14="http://schemas.microsoft.com/office/powerpoint/2010/main" val="3116422023"/>
       </p:ext>
     </p:extLst>
   </p:cSld>
@@ -1507,13 +1679,7 @@
       </p:grpSpPr>
       <p:sp>
         <p:nvSpPr>
-          <p:cNvPr id="2" name="Title 1">
-            <a:extLst>
-              <a:ext uri="{FF2B5EF4-FFF2-40B4-BE49-F238E27FC236}">
-                <a16:creationId xmlns:a16="http://schemas.microsoft.com/office/drawing/2014/main" id="{B10C663C-BFD1-4E45-B884-D8E2C79AA28A}"/>
-              </a:ext>
-            </a:extLst>
-          </p:cNvPr>
+          <p:cNvPr id="10" name="Title 9"/>
           <p:cNvSpPr>
             <a:spLocks noGrp="1"/>
           </p:cNvSpPr>
@@ -1523,8 +1689,8 @@
         </p:nvSpPr>
         <p:spPr>
           <a:xfrm>
-            <a:off x="839788" y="365125"/>
-            <a:ext cx="10515600" cy="1325563"/>
+            <a:off x="1097280" y="286603"/>
+            <a:ext cx="10058400" cy="1450757"/>
           </a:xfrm>
         </p:spPr>
         <p:txBody>
@@ -1535,19 +1701,13 @@
               <a:rPr lang="en-US"/>
               <a:t>Click to edit Master title style</a:t>
             </a:r>
-            <a:endParaRPr lang="en-GB"/>
-          </a:p>
-        </p:txBody>
-      </p:sp>
-      <p:sp>
-        <p:nvSpPr>
-          <p:cNvPr id="3" name="Text Placeholder 2">
-            <a:extLst>
-              <a:ext uri="{FF2B5EF4-FFF2-40B4-BE49-F238E27FC236}">
-                <a16:creationId xmlns:a16="http://schemas.microsoft.com/office/drawing/2014/main" id="{A730569E-F0CB-4FCB-9005-6CF888C1A7DA}"/>
-              </a:ext>
-            </a:extLst>
-          </p:cNvPr>
+            <a:endParaRPr lang="en-US" dirty="0"/>
+          </a:p>
+        </p:txBody>
+      </p:sp>
+      <p:sp>
+        <p:nvSpPr>
+          <p:cNvPr id="3" name="Text Placeholder 2"/>
           <p:cNvSpPr>
             <a:spLocks noGrp="1"/>
           </p:cNvSpPr>
@@ -1557,16 +1717,22 @@
         </p:nvSpPr>
         <p:spPr>
           <a:xfrm>
-            <a:off x="839788" y="1681163"/>
-            <a:ext cx="5157787" cy="823912"/>
-          </a:xfrm>
-        </p:spPr>
-        <p:txBody>
-          <a:bodyPr anchor="b"/>
+            <a:off x="1097280" y="1846052"/>
+            <a:ext cx="4937760" cy="736282"/>
+          </a:xfrm>
+        </p:spPr>
+        <p:txBody>
+          <a:bodyPr lIns="91440" rIns="91440" anchor="ctr">
+            <a:normAutofit/>
+          </a:bodyPr>
           <a:lstStyle>
             <a:lvl1pPr marL="0" indent="0">
               <a:buNone/>
-              <a:defRPr sz="2400" b="1"/>
+              <a:defRPr sz="2000" b="0" cap="all" baseline="0">
+                <a:solidFill>
+                  <a:schemeClr val="tx2"/>
+                </a:solidFill>
+              </a:defRPr>
             </a:lvl1pPr>
             <a:lvl2pPr marL="457200" indent="0">
               <a:buNone/>
@@ -1612,13 +1778,7 @@
       </p:sp>
       <p:sp>
         <p:nvSpPr>
-          <p:cNvPr id="4" name="Content Placeholder 3">
-            <a:extLst>
-              <a:ext uri="{FF2B5EF4-FFF2-40B4-BE49-F238E27FC236}">
-                <a16:creationId xmlns:a16="http://schemas.microsoft.com/office/drawing/2014/main" id="{E69314F8-3B14-4B83-9474-5EF512152637}"/>
-              </a:ext>
-            </a:extLst>
-          </p:cNvPr>
+          <p:cNvPr id="4" name="Content Placeholder 3"/>
           <p:cNvSpPr>
             <a:spLocks noGrp="1"/>
           </p:cNvSpPr>
@@ -1628,8 +1788,8 @@
         </p:nvSpPr>
         <p:spPr>
           <a:xfrm>
-            <a:off x="839788" y="2505075"/>
-            <a:ext cx="5157787" cy="3684588"/>
+            <a:off x="1097280" y="2582334"/>
+            <a:ext cx="4937760" cy="3378200"/>
           </a:xfrm>
         </p:spPr>
         <p:txBody>
@@ -1669,19 +1829,13 @@
               <a:rPr lang="en-US"/>
               <a:t>Fifth level</a:t>
             </a:r>
-            <a:endParaRPr lang="en-GB"/>
-          </a:p>
-        </p:txBody>
-      </p:sp>
-      <p:sp>
-        <p:nvSpPr>
-          <p:cNvPr id="5" name="Text Placeholder 4">
-            <a:extLst>
-              <a:ext uri="{FF2B5EF4-FFF2-40B4-BE49-F238E27FC236}">
-                <a16:creationId xmlns:a16="http://schemas.microsoft.com/office/drawing/2014/main" id="{7B63135D-0848-4E97-B6A8-81B71C2195C6}"/>
-              </a:ext>
-            </a:extLst>
-          </p:cNvPr>
+            <a:endParaRPr lang="en-US" dirty="0"/>
+          </a:p>
+        </p:txBody>
+      </p:sp>
+      <p:sp>
+        <p:nvSpPr>
+          <p:cNvPr id="5" name="Text Placeholder 4"/>
           <p:cNvSpPr>
             <a:spLocks noGrp="1"/>
           </p:cNvSpPr>
@@ -1691,16 +1845,22 @@
         </p:nvSpPr>
         <p:spPr>
           <a:xfrm>
-            <a:off x="6172200" y="1681163"/>
-            <a:ext cx="5183188" cy="823912"/>
-          </a:xfrm>
-        </p:spPr>
-        <p:txBody>
-          <a:bodyPr anchor="b"/>
+            <a:off x="6217920" y="1846052"/>
+            <a:ext cx="4937760" cy="736282"/>
+          </a:xfrm>
+        </p:spPr>
+        <p:txBody>
+          <a:bodyPr lIns="91440" rIns="91440" anchor="ctr">
+            <a:normAutofit/>
+          </a:bodyPr>
           <a:lstStyle>
             <a:lvl1pPr marL="0" indent="0">
               <a:buNone/>
-              <a:defRPr sz="2400" b="1"/>
+              <a:defRPr sz="2000" b="0" cap="all" baseline="0">
+                <a:solidFill>
+                  <a:schemeClr val="tx2"/>
+                </a:solidFill>
+              </a:defRPr>
             </a:lvl1pPr>
             <a:lvl2pPr marL="457200" indent="0">
               <a:buNone/>
@@ -1746,13 +1906,7 @@
       </p:sp>
       <p:sp>
         <p:nvSpPr>
-          <p:cNvPr id="6" name="Content Placeholder 5">
-            <a:extLst>
-              <a:ext uri="{FF2B5EF4-FFF2-40B4-BE49-F238E27FC236}">
-                <a16:creationId xmlns:a16="http://schemas.microsoft.com/office/drawing/2014/main" id="{7803478B-75E1-40D4-9480-2ACD518DE9DF}"/>
-              </a:ext>
-            </a:extLst>
-          </p:cNvPr>
+          <p:cNvPr id="6" name="Content Placeholder 5"/>
           <p:cNvSpPr>
             <a:spLocks noGrp="1"/>
           </p:cNvSpPr>
@@ -1762,8 +1916,8 @@
         </p:nvSpPr>
         <p:spPr>
           <a:xfrm>
-            <a:off x="6172200" y="2505075"/>
-            <a:ext cx="5183188" cy="3684588"/>
+            <a:off x="6217920" y="2582334"/>
+            <a:ext cx="4937760" cy="3378200"/>
           </a:xfrm>
         </p:spPr>
         <p:txBody>
@@ -1803,19 +1957,13 @@
               <a:rPr lang="en-US"/>
               <a:t>Fifth level</a:t>
             </a:r>
-            <a:endParaRPr lang="en-GB"/>
-          </a:p>
-        </p:txBody>
-      </p:sp>
-      <p:sp>
-        <p:nvSpPr>
-          <p:cNvPr id="7" name="Date Placeholder 6">
-            <a:extLst>
-              <a:ext uri="{FF2B5EF4-FFF2-40B4-BE49-F238E27FC236}">
-                <a16:creationId xmlns:a16="http://schemas.microsoft.com/office/drawing/2014/main" id="{C7B1B338-5E2B-4276-9836-4C612021BDCB}"/>
-              </a:ext>
-            </a:extLst>
-          </p:cNvPr>
+            <a:endParaRPr lang="en-US" dirty="0"/>
+          </a:p>
+        </p:txBody>
+      </p:sp>
+      <p:sp>
+        <p:nvSpPr>
+          <p:cNvPr id="7" name="Date Placeholder 6"/>
           <p:cNvSpPr>
             <a:spLocks noGrp="1"/>
           </p:cNvSpPr>
@@ -1838,13 +1986,7 @@
       </p:sp>
       <p:sp>
         <p:nvSpPr>
-          <p:cNvPr id="8" name="Footer Placeholder 7">
-            <a:extLst>
-              <a:ext uri="{FF2B5EF4-FFF2-40B4-BE49-F238E27FC236}">
-                <a16:creationId xmlns:a16="http://schemas.microsoft.com/office/drawing/2014/main" id="{63DD6B7D-D4B4-4971-93EF-CCC74B0C7F94}"/>
-              </a:ext>
-            </a:extLst>
-          </p:cNvPr>
+          <p:cNvPr id="8" name="Footer Placeholder 7"/>
           <p:cNvSpPr>
             <a:spLocks noGrp="1"/>
           </p:cNvSpPr>
@@ -1863,13 +2005,7 @@
       </p:sp>
       <p:sp>
         <p:nvSpPr>
-          <p:cNvPr id="9" name="Slide Number Placeholder 8">
-            <a:extLst>
-              <a:ext uri="{FF2B5EF4-FFF2-40B4-BE49-F238E27FC236}">
-                <a16:creationId xmlns:a16="http://schemas.microsoft.com/office/drawing/2014/main" id="{8281EC68-952B-4217-A045-0258D0C80E07}"/>
-              </a:ext>
-            </a:extLst>
-          </p:cNvPr>
+          <p:cNvPr id="9" name="Slide Number Placeholder 8"/>
           <p:cNvSpPr>
             <a:spLocks noGrp="1"/>
           </p:cNvSpPr>
@@ -1893,7 +2029,7 @@
     </p:spTree>
     <p:extLst>
       <p:ext uri="{BB962C8B-B14F-4D97-AF65-F5344CB8AC3E}">
-        <p14:creationId xmlns:p14="http://schemas.microsoft.com/office/powerpoint/2010/main" val="3735229371"/>
+        <p14:creationId xmlns:p14="http://schemas.microsoft.com/office/powerpoint/2010/main" val="1365839761"/>
       </p:ext>
     </p:extLst>
   </p:cSld>
@@ -1922,13 +2058,7 @@
       </p:grpSpPr>
       <p:sp>
         <p:nvSpPr>
-          <p:cNvPr id="2" name="Title 1">
-            <a:extLst>
-              <a:ext uri="{FF2B5EF4-FFF2-40B4-BE49-F238E27FC236}">
-                <a16:creationId xmlns:a16="http://schemas.microsoft.com/office/drawing/2014/main" id="{51B4CCF6-E462-4362-B576-1005ECC02813}"/>
-              </a:ext>
-            </a:extLst>
-          </p:cNvPr>
+          <p:cNvPr id="2" name="Title 1"/>
           <p:cNvSpPr>
             <a:spLocks noGrp="1"/>
           </p:cNvSpPr>
@@ -1945,19 +2075,13 @@
               <a:rPr lang="en-US"/>
               <a:t>Click to edit Master title style</a:t>
             </a:r>
-            <a:endParaRPr lang="en-GB"/>
-          </a:p>
-        </p:txBody>
-      </p:sp>
-      <p:sp>
-        <p:nvSpPr>
-          <p:cNvPr id="3" name="Date Placeholder 2">
-            <a:extLst>
-              <a:ext uri="{FF2B5EF4-FFF2-40B4-BE49-F238E27FC236}">
-                <a16:creationId xmlns:a16="http://schemas.microsoft.com/office/drawing/2014/main" id="{7677D685-242D-4402-9557-B203CCED770A}"/>
-              </a:ext>
-            </a:extLst>
-          </p:cNvPr>
+            <a:endParaRPr lang="en-US" dirty="0"/>
+          </a:p>
+        </p:txBody>
+      </p:sp>
+      <p:sp>
+        <p:nvSpPr>
+          <p:cNvPr id="3" name="Date Placeholder 2"/>
           <p:cNvSpPr>
             <a:spLocks noGrp="1"/>
           </p:cNvSpPr>
@@ -1980,13 +2104,7 @@
       </p:sp>
       <p:sp>
         <p:nvSpPr>
-          <p:cNvPr id="4" name="Footer Placeholder 3">
-            <a:extLst>
-              <a:ext uri="{FF2B5EF4-FFF2-40B4-BE49-F238E27FC236}">
-                <a16:creationId xmlns:a16="http://schemas.microsoft.com/office/drawing/2014/main" id="{D69DB9DD-F7DE-45B7-88C3-D3E4E576D4BC}"/>
-              </a:ext>
-            </a:extLst>
-          </p:cNvPr>
+          <p:cNvPr id="4" name="Footer Placeholder 3"/>
           <p:cNvSpPr>
             <a:spLocks noGrp="1"/>
           </p:cNvSpPr>
@@ -2005,13 +2123,7 @@
       </p:sp>
       <p:sp>
         <p:nvSpPr>
-          <p:cNvPr id="5" name="Slide Number Placeholder 4">
-            <a:extLst>
-              <a:ext uri="{FF2B5EF4-FFF2-40B4-BE49-F238E27FC236}">
-                <a16:creationId xmlns:a16="http://schemas.microsoft.com/office/drawing/2014/main" id="{B464AC56-C2EC-4B11-AA5F-9417CD7EA66F}"/>
-              </a:ext>
-            </a:extLst>
-          </p:cNvPr>
+          <p:cNvPr id="5" name="Slide Number Placeholder 4"/>
           <p:cNvSpPr>
             <a:spLocks noGrp="1"/>
           </p:cNvSpPr>
@@ -2035,7 +2147,7 @@
     </p:spTree>
     <p:extLst>
       <p:ext uri="{BB962C8B-B14F-4D97-AF65-F5344CB8AC3E}">
-        <p14:creationId xmlns:p14="http://schemas.microsoft.com/office/powerpoint/2010/main" val="1210446982"/>
+        <p14:creationId xmlns:p14="http://schemas.microsoft.com/office/powerpoint/2010/main" val="2561813906"/>
       </p:ext>
     </p:extLst>
   </p:cSld>
@@ -2046,7 +2158,7 @@
 </file>
 
 <file path=ppt/slideLayouts/slideLayout7.xml><?xml version="1.0" encoding="utf-8"?>
-<p:sldLayout xmlns:a="http://schemas.openxmlformats.org/drawingml/2006/main" xmlns:r="http://schemas.openxmlformats.org/officeDocument/2006/relationships" xmlns:p="http://schemas.openxmlformats.org/presentationml/2006/main" type="blank" preserve="1">
+<p:sldLayout xmlns:a="http://schemas.openxmlformats.org/drawingml/2006/main" xmlns:r="http://schemas.openxmlformats.org/officeDocument/2006/relationships" xmlns:p="http://schemas.openxmlformats.org/presentationml/2006/main" showMasterSp="0" type="blank" preserve="1">
   <p:cSld name="Blank">
     <p:spTree>
       <p:nvGrpSpPr>
@@ -2064,13 +2176,83 @@
       </p:grpSpPr>
       <p:sp>
         <p:nvSpPr>
-          <p:cNvPr id="2" name="Date Placeholder 1">
-            <a:extLst>
-              <a:ext uri="{FF2B5EF4-FFF2-40B4-BE49-F238E27FC236}">
-                <a16:creationId xmlns:a16="http://schemas.microsoft.com/office/drawing/2014/main" id="{4AF4DC34-4FF4-4DD8-A894-E50DCEB9CA5A}"/>
-              </a:ext>
-            </a:extLst>
-          </p:cNvPr>
+          <p:cNvPr id="5" name="Rectangle 4"/>
+          <p:cNvSpPr/>
+          <p:nvPr/>
+        </p:nvSpPr>
+        <p:spPr>
+          <a:xfrm>
+            <a:off x="3175" y="6400800"/>
+            <a:ext cx="12188825" cy="457200"/>
+          </a:xfrm>
+          <a:prstGeom prst="rect">
+            <a:avLst/>
+          </a:prstGeom>
+          <a:solidFill>
+            <a:schemeClr val="accent2"/>
+          </a:solidFill>
+          <a:ln>
+            <a:noFill/>
+          </a:ln>
+        </p:spPr>
+        <p:style>
+          <a:lnRef idx="2">
+            <a:schemeClr val="accent1">
+              <a:shade val="50000"/>
+            </a:schemeClr>
+          </a:lnRef>
+          <a:fillRef idx="1">
+            <a:schemeClr val="accent1"/>
+          </a:fillRef>
+          <a:effectRef idx="0">
+            <a:schemeClr val="accent1"/>
+          </a:effectRef>
+          <a:fontRef idx="minor">
+            <a:schemeClr val="lt1"/>
+          </a:fontRef>
+        </p:style>
+      </p:sp>
+      <p:sp>
+        <p:nvSpPr>
+          <p:cNvPr id="6" name="Rectangle 5"/>
+          <p:cNvSpPr/>
+          <p:nvPr/>
+        </p:nvSpPr>
+        <p:spPr>
+          <a:xfrm>
+            <a:off x="15" y="6334316"/>
+            <a:ext cx="12188825" cy="64008"/>
+          </a:xfrm>
+          <a:prstGeom prst="rect">
+            <a:avLst/>
+          </a:prstGeom>
+          <a:solidFill>
+            <a:schemeClr val="accent1"/>
+          </a:solidFill>
+          <a:ln>
+            <a:noFill/>
+          </a:ln>
+        </p:spPr>
+        <p:style>
+          <a:lnRef idx="2">
+            <a:schemeClr val="accent1">
+              <a:shade val="50000"/>
+            </a:schemeClr>
+          </a:lnRef>
+          <a:fillRef idx="1">
+            <a:schemeClr val="accent1"/>
+          </a:fillRef>
+          <a:effectRef idx="0">
+            <a:schemeClr val="accent1"/>
+          </a:effectRef>
+          <a:fontRef idx="minor">
+            <a:schemeClr val="lt1"/>
+          </a:fontRef>
+        </p:style>
+      </p:sp>
+      <p:sp>
+        <p:nvSpPr>
+          <p:cNvPr id="7" name="Date Placeholder 6"/>
           <p:cNvSpPr>
             <a:spLocks noGrp="1"/>
           </p:cNvSpPr>
@@ -2093,13 +2275,7 @@
       </p:sp>
       <p:sp>
         <p:nvSpPr>
-          <p:cNvPr id="3" name="Footer Placeholder 2">
-            <a:extLst>
-              <a:ext uri="{FF2B5EF4-FFF2-40B4-BE49-F238E27FC236}">
-                <a16:creationId xmlns:a16="http://schemas.microsoft.com/office/drawing/2014/main" id="{85C5F0B2-26EE-4C4A-8C0B-4E9C6C9B4E7B}"/>
-              </a:ext>
-            </a:extLst>
-          </p:cNvPr>
+          <p:cNvPr id="8" name="Footer Placeholder 7"/>
           <p:cNvSpPr>
             <a:spLocks noGrp="1"/>
           </p:cNvSpPr>
@@ -2110,7 +2286,15 @@
         <p:spPr/>
         <p:txBody>
           <a:bodyPr/>
-          <a:lstStyle/>
+          <a:lstStyle>
+            <a:lvl1pPr>
+              <a:defRPr>
+                <a:solidFill>
+                  <a:srgbClr val="FFFFFF"/>
+                </a:solidFill>
+              </a:defRPr>
+            </a:lvl1pPr>
+          </a:lstStyle>
           <a:p>
             <a:endParaRPr lang="en-GB"/>
           </a:p>
@@ -2118,13 +2302,7 @@
       </p:sp>
       <p:sp>
         <p:nvSpPr>
-          <p:cNvPr id="4" name="Slide Number Placeholder 3">
-            <a:extLst>
-              <a:ext uri="{FF2B5EF4-FFF2-40B4-BE49-F238E27FC236}">
-                <a16:creationId xmlns:a16="http://schemas.microsoft.com/office/drawing/2014/main" id="{75873D72-F6FD-4F0C-813C-EDC0E32A99F0}"/>
-              </a:ext>
-            </a:extLst>
-          </p:cNvPr>
+          <p:cNvPr id="9" name="Slide Number Placeholder 8"/>
           <p:cNvSpPr>
             <a:spLocks noGrp="1"/>
           </p:cNvSpPr>
@@ -2148,7 +2326,7 @@
     </p:spTree>
     <p:extLst>
       <p:ext uri="{BB962C8B-B14F-4D97-AF65-F5344CB8AC3E}">
-        <p14:creationId xmlns:p14="http://schemas.microsoft.com/office/powerpoint/2010/main" val="2223866113"/>
+        <p14:creationId xmlns:p14="http://schemas.microsoft.com/office/powerpoint/2010/main" val="4067141091"/>
       </p:ext>
     </p:extLst>
   </p:cSld>
@@ -2159,7 +2337,7 @@
 </file>
 
 <file path=ppt/slideLayouts/slideLayout8.xml><?xml version="1.0" encoding="utf-8"?>
-<p:sldLayout xmlns:a="http://schemas.openxmlformats.org/drawingml/2006/main" xmlns:r="http://schemas.openxmlformats.org/officeDocument/2006/relationships" xmlns:p="http://schemas.openxmlformats.org/presentationml/2006/main" type="objTx" preserve="1">
+<p:sldLayout xmlns:a="http://schemas.openxmlformats.org/drawingml/2006/main" xmlns:r="http://schemas.openxmlformats.org/officeDocument/2006/relationships" xmlns:p="http://schemas.openxmlformats.org/presentationml/2006/main" showMasterSp="0" type="objTx" preserve="1">
   <p:cSld name="Content with Caption">
     <p:spTree>
       <p:nvGrpSpPr>
@@ -2177,13 +2355,83 @@
       </p:grpSpPr>
       <p:sp>
         <p:nvSpPr>
-          <p:cNvPr id="2" name="Title 1">
-            <a:extLst>
-              <a:ext uri="{FF2B5EF4-FFF2-40B4-BE49-F238E27FC236}">
-                <a16:creationId xmlns:a16="http://schemas.microsoft.com/office/drawing/2014/main" id="{E1609733-0F31-4EEF-9C6F-349DD35712E8}"/>
-              </a:ext>
-            </a:extLst>
-          </p:cNvPr>
+          <p:cNvPr id="8" name="Rectangle 7"/>
+          <p:cNvSpPr/>
+          <p:nvPr/>
+        </p:nvSpPr>
+        <p:spPr>
+          <a:xfrm>
+            <a:off x="16" y="0"/>
+            <a:ext cx="4050791" cy="6858000"/>
+          </a:xfrm>
+          <a:prstGeom prst="rect">
+            <a:avLst/>
+          </a:prstGeom>
+          <a:solidFill>
+            <a:schemeClr val="accent2"/>
+          </a:solidFill>
+          <a:ln>
+            <a:noFill/>
+          </a:ln>
+        </p:spPr>
+        <p:style>
+          <a:lnRef idx="2">
+            <a:schemeClr val="accent1">
+              <a:shade val="50000"/>
+            </a:schemeClr>
+          </a:lnRef>
+          <a:fillRef idx="1">
+            <a:schemeClr val="accent1"/>
+          </a:fillRef>
+          <a:effectRef idx="0">
+            <a:schemeClr val="accent1"/>
+          </a:effectRef>
+          <a:fontRef idx="minor">
+            <a:schemeClr val="lt1"/>
+          </a:fontRef>
+        </p:style>
+      </p:sp>
+      <p:sp>
+        <p:nvSpPr>
+          <p:cNvPr id="9" name="Rectangle 8"/>
+          <p:cNvSpPr/>
+          <p:nvPr/>
+        </p:nvSpPr>
+        <p:spPr>
+          <a:xfrm>
+            <a:off x="4040071" y="0"/>
+            <a:ext cx="64008" cy="6858000"/>
+          </a:xfrm>
+          <a:prstGeom prst="rect">
+            <a:avLst/>
+          </a:prstGeom>
+          <a:solidFill>
+            <a:schemeClr val="accent1"/>
+          </a:solidFill>
+          <a:ln>
+            <a:noFill/>
+          </a:ln>
+        </p:spPr>
+        <p:style>
+          <a:lnRef idx="2">
+            <a:schemeClr val="accent1">
+              <a:shade val="50000"/>
+            </a:schemeClr>
+          </a:lnRef>
+          <a:fillRef idx="1">
+            <a:schemeClr val="accent1"/>
+          </a:fillRef>
+          <a:effectRef idx="0">
+            <a:schemeClr val="accent1"/>
+          </a:effectRef>
+          <a:fontRef idx="minor">
+            <a:schemeClr val="lt1"/>
+          </a:fontRef>
+        </p:style>
+      </p:sp>
+      <p:sp>
+        <p:nvSpPr>
+          <p:cNvPr id="2" name="Title 1"/>
           <p:cNvSpPr>
             <a:spLocks noGrp="1"/>
           </p:cNvSpPr>
@@ -2193,15 +2441,21 @@
         </p:nvSpPr>
         <p:spPr>
           <a:xfrm>
-            <a:off x="839788" y="457200"/>
-            <a:ext cx="3932237" cy="1600200"/>
-          </a:xfrm>
-        </p:spPr>
-        <p:txBody>
-          <a:bodyPr anchor="b"/>
+            <a:off x="457200" y="594359"/>
+            <a:ext cx="3200400" cy="2286000"/>
+          </a:xfrm>
+        </p:spPr>
+        <p:txBody>
+          <a:bodyPr anchor="b">
+            <a:normAutofit/>
+          </a:bodyPr>
           <a:lstStyle>
             <a:lvl1pPr>
-              <a:defRPr sz="3200"/>
+              <a:defRPr sz="3600" b="0">
+                <a:solidFill>
+                  <a:srgbClr val="FFFFFF"/>
+                </a:solidFill>
+              </a:defRPr>
             </a:lvl1pPr>
           </a:lstStyle>
           <a:p>
@@ -2209,19 +2463,13 @@
               <a:rPr lang="en-US"/>
               <a:t>Click to edit Master title style</a:t>
             </a:r>
-            <a:endParaRPr lang="en-GB"/>
-          </a:p>
-        </p:txBody>
-      </p:sp>
-      <p:sp>
-        <p:nvSpPr>
-          <p:cNvPr id="3" name="Content Placeholder 2">
-            <a:extLst>
-              <a:ext uri="{FF2B5EF4-FFF2-40B4-BE49-F238E27FC236}">
-                <a16:creationId xmlns:a16="http://schemas.microsoft.com/office/drawing/2014/main" id="{98651F70-2258-48B8-BF7A-E17E698A87DD}"/>
-              </a:ext>
-            </a:extLst>
-          </p:cNvPr>
+            <a:endParaRPr lang="en-US" dirty="0"/>
+          </a:p>
+        </p:txBody>
+      </p:sp>
+      <p:sp>
+        <p:nvSpPr>
+          <p:cNvPr id="3" name="Content Placeholder 2"/>
           <p:cNvSpPr>
             <a:spLocks noGrp="1"/>
           </p:cNvSpPr>
@@ -2231,170 +2479,145 @@
         </p:nvSpPr>
         <p:spPr>
           <a:xfrm>
-            <a:off x="5183188" y="987425"/>
-            <a:ext cx="6172200" cy="4873625"/>
+            <a:off x="4800600" y="731520"/>
+            <a:ext cx="6492240" cy="5257800"/>
+          </a:xfrm>
+        </p:spPr>
+        <p:txBody>
+          <a:bodyPr/>
+          <a:lstStyle/>
+          <a:p>
+            <a:pPr lvl="0"/>
+            <a:r>
+              <a:rPr lang="en-US"/>
+              <a:t>Click to edit Master text styles</a:t>
+            </a:r>
+          </a:p>
+          <a:p>
+            <a:pPr lvl="1"/>
+            <a:r>
+              <a:rPr lang="en-US"/>
+              <a:t>Second level</a:t>
+            </a:r>
+          </a:p>
+          <a:p>
+            <a:pPr lvl="2"/>
+            <a:r>
+              <a:rPr lang="en-US"/>
+              <a:t>Third level</a:t>
+            </a:r>
+          </a:p>
+          <a:p>
+            <a:pPr lvl="3"/>
+            <a:r>
+              <a:rPr lang="en-US"/>
+              <a:t>Fourth level</a:t>
+            </a:r>
+          </a:p>
+          <a:p>
+            <a:pPr lvl="4"/>
+            <a:r>
+              <a:rPr lang="en-US"/>
+              <a:t>Fifth level</a:t>
+            </a:r>
+            <a:endParaRPr lang="en-US" dirty="0"/>
+          </a:p>
+        </p:txBody>
+      </p:sp>
+      <p:sp>
+        <p:nvSpPr>
+          <p:cNvPr id="4" name="Text Placeholder 3"/>
+          <p:cNvSpPr>
+            <a:spLocks noGrp="1"/>
+          </p:cNvSpPr>
+          <p:nvPr>
+            <p:ph type="body" sz="half" idx="2"/>
+          </p:nvPr>
+        </p:nvSpPr>
+        <p:spPr>
+          <a:xfrm>
+            <a:off x="457200" y="2926080"/>
+            <a:ext cx="3200400" cy="3379124"/>
+          </a:xfrm>
+        </p:spPr>
+        <p:txBody>
+          <a:bodyPr lIns="91440" rIns="91440">
+            <a:normAutofit/>
+          </a:bodyPr>
+          <a:lstStyle>
+            <a:lvl1pPr marL="0" indent="0">
+              <a:buNone/>
+              <a:defRPr sz="1500">
+                <a:solidFill>
+                  <a:srgbClr val="FFFFFF"/>
+                </a:solidFill>
+              </a:defRPr>
+            </a:lvl1pPr>
+            <a:lvl2pPr marL="457200" indent="0">
+              <a:buNone/>
+              <a:defRPr sz="1200"/>
+            </a:lvl2pPr>
+            <a:lvl3pPr marL="914400" indent="0">
+              <a:buNone/>
+              <a:defRPr sz="1000"/>
+            </a:lvl3pPr>
+            <a:lvl4pPr marL="1371600" indent="0">
+              <a:buNone/>
+              <a:defRPr sz="900"/>
+            </a:lvl4pPr>
+            <a:lvl5pPr marL="1828800" indent="0">
+              <a:buNone/>
+              <a:defRPr sz="900"/>
+            </a:lvl5pPr>
+            <a:lvl6pPr marL="2286000" indent="0">
+              <a:buNone/>
+              <a:defRPr sz="900"/>
+            </a:lvl6pPr>
+            <a:lvl7pPr marL="2743200" indent="0">
+              <a:buNone/>
+              <a:defRPr sz="900"/>
+            </a:lvl7pPr>
+            <a:lvl8pPr marL="3200400" indent="0">
+              <a:buNone/>
+              <a:defRPr sz="900"/>
+            </a:lvl8pPr>
+            <a:lvl9pPr marL="3657600" indent="0">
+              <a:buNone/>
+              <a:defRPr sz="900"/>
+            </a:lvl9pPr>
+          </a:lstStyle>
+          <a:p>
+            <a:pPr lvl="0"/>
+            <a:r>
+              <a:rPr lang="en-US"/>
+              <a:t>Click to edit Master text styles</a:t>
+            </a:r>
+          </a:p>
+        </p:txBody>
+      </p:sp>
+      <p:sp>
+        <p:nvSpPr>
+          <p:cNvPr id="5" name="Date Placeholder 4"/>
+          <p:cNvSpPr>
+            <a:spLocks noGrp="1"/>
+          </p:cNvSpPr>
+          <p:nvPr>
+            <p:ph type="dt" sz="half" idx="10"/>
+          </p:nvPr>
+        </p:nvSpPr>
+        <p:spPr>
+          <a:xfrm>
+            <a:off x="465512" y="6459785"/>
+            <a:ext cx="2618510" cy="365125"/>
           </a:xfrm>
         </p:spPr>
         <p:txBody>
           <a:bodyPr/>
           <a:lstStyle>
-            <a:lvl1pPr>
-              <a:defRPr sz="3200"/>
+            <a:lvl1pPr algn="l">
+              <a:defRPr/>
             </a:lvl1pPr>
-            <a:lvl2pPr>
-              <a:defRPr sz="2800"/>
-            </a:lvl2pPr>
-            <a:lvl3pPr>
-              <a:defRPr sz="2400"/>
-            </a:lvl3pPr>
-            <a:lvl4pPr>
-              <a:defRPr sz="2000"/>
-            </a:lvl4pPr>
-            <a:lvl5pPr>
-              <a:defRPr sz="2000"/>
-            </a:lvl5pPr>
-            <a:lvl6pPr>
-              <a:defRPr sz="2000"/>
-            </a:lvl6pPr>
-            <a:lvl7pPr>
-              <a:defRPr sz="2000"/>
-            </a:lvl7pPr>
-            <a:lvl8pPr>
-              <a:defRPr sz="2000"/>
-            </a:lvl8pPr>
-            <a:lvl9pPr>
-              <a:defRPr sz="2000"/>
-            </a:lvl9pPr>
           </a:lstStyle>
-          <a:p>
-            <a:pPr lvl="0"/>
-            <a:r>
-              <a:rPr lang="en-US"/>
-              <a:t>Click to edit Master text styles</a:t>
-            </a:r>
-          </a:p>
-          <a:p>
-            <a:pPr lvl="1"/>
-            <a:r>
-              <a:rPr lang="en-US"/>
-              <a:t>Second level</a:t>
-            </a:r>
-          </a:p>
-          <a:p>
-            <a:pPr lvl="2"/>
-            <a:r>
-              <a:rPr lang="en-US"/>
-              <a:t>Third level</a:t>
-            </a:r>
-          </a:p>
-          <a:p>
-            <a:pPr lvl="3"/>
-            <a:r>
-              <a:rPr lang="en-US"/>
-              <a:t>Fourth level</a:t>
-            </a:r>
-          </a:p>
-          <a:p>
-            <a:pPr lvl="4"/>
-            <a:r>
-              <a:rPr lang="en-US"/>
-              <a:t>Fifth level</a:t>
-            </a:r>
-            <a:endParaRPr lang="en-GB"/>
-          </a:p>
-        </p:txBody>
-      </p:sp>
-      <p:sp>
-        <p:nvSpPr>
-          <p:cNvPr id="4" name="Text Placeholder 3">
-            <a:extLst>
-              <a:ext uri="{FF2B5EF4-FFF2-40B4-BE49-F238E27FC236}">
-                <a16:creationId xmlns:a16="http://schemas.microsoft.com/office/drawing/2014/main" id="{B8035A28-4A4B-466F-B074-473FF9B75A02}"/>
-              </a:ext>
-            </a:extLst>
-          </p:cNvPr>
-          <p:cNvSpPr>
-            <a:spLocks noGrp="1"/>
-          </p:cNvSpPr>
-          <p:nvPr>
-            <p:ph type="body" sz="half" idx="2"/>
-          </p:nvPr>
-        </p:nvSpPr>
-        <p:spPr>
-          <a:xfrm>
-            <a:off x="839788" y="2057400"/>
-            <a:ext cx="3932237" cy="3811588"/>
-          </a:xfrm>
-        </p:spPr>
-        <p:txBody>
-          <a:bodyPr/>
-          <a:lstStyle>
-            <a:lvl1pPr marL="0" indent="0">
-              <a:buNone/>
-              <a:defRPr sz="1600"/>
-            </a:lvl1pPr>
-            <a:lvl2pPr marL="457200" indent="0">
-              <a:buNone/>
-              <a:defRPr sz="1400"/>
-            </a:lvl2pPr>
-            <a:lvl3pPr marL="914400" indent="0">
-              <a:buNone/>
-              <a:defRPr sz="1200"/>
-            </a:lvl3pPr>
-            <a:lvl4pPr marL="1371600" indent="0">
-              <a:buNone/>
-              <a:defRPr sz="1000"/>
-            </a:lvl4pPr>
-            <a:lvl5pPr marL="1828800" indent="0">
-              <a:buNone/>
-              <a:defRPr sz="1000"/>
-            </a:lvl5pPr>
-            <a:lvl6pPr marL="2286000" indent="0">
-              <a:buNone/>
-              <a:defRPr sz="1000"/>
-            </a:lvl6pPr>
-            <a:lvl7pPr marL="2743200" indent="0">
-              <a:buNone/>
-              <a:defRPr sz="1000"/>
-            </a:lvl7pPr>
-            <a:lvl8pPr marL="3200400" indent="0">
-              <a:buNone/>
-              <a:defRPr sz="1000"/>
-            </a:lvl8pPr>
-            <a:lvl9pPr marL="3657600" indent="0">
-              <a:buNone/>
-              <a:defRPr sz="1000"/>
-            </a:lvl9pPr>
-          </a:lstStyle>
-          <a:p>
-            <a:pPr lvl="0"/>
-            <a:r>
-              <a:rPr lang="en-US"/>
-              <a:t>Click to edit Master text styles</a:t>
-            </a:r>
-          </a:p>
-        </p:txBody>
-      </p:sp>
-      <p:sp>
-        <p:nvSpPr>
-          <p:cNvPr id="5" name="Date Placeholder 4">
-            <a:extLst>
-              <a:ext uri="{FF2B5EF4-FFF2-40B4-BE49-F238E27FC236}">
-                <a16:creationId xmlns:a16="http://schemas.microsoft.com/office/drawing/2014/main" id="{AA370262-4E04-451F-9367-721F49A06A33}"/>
-              </a:ext>
-            </a:extLst>
-          </p:cNvPr>
-          <p:cNvSpPr>
-            <a:spLocks noGrp="1"/>
-          </p:cNvSpPr>
-          <p:nvPr>
-            <p:ph type="dt" sz="half" idx="10"/>
-          </p:nvPr>
-        </p:nvSpPr>
-        <p:spPr/>
-        <p:txBody>
-          <a:bodyPr/>
-          <a:lstStyle/>
           <a:p>
             <a:fld id="{2A20AF9C-5229-497D-A071-2AB857D7C6F5}" type="datetimeFigureOut">
               <a:rPr lang="en-GB" smtClean="0"/>
@@ -2406,13 +2629,7 @@
       </p:sp>
       <p:sp>
         <p:nvSpPr>
-          <p:cNvPr id="6" name="Footer Placeholder 5">
-            <a:extLst>
-              <a:ext uri="{FF2B5EF4-FFF2-40B4-BE49-F238E27FC236}">
-                <a16:creationId xmlns:a16="http://schemas.microsoft.com/office/drawing/2014/main" id="{0E8E7D9F-ACE7-4011-A613-F3309A0BEF3E}"/>
-              </a:ext>
-            </a:extLst>
-          </p:cNvPr>
+          <p:cNvPr id="6" name="Footer Placeholder 5"/>
           <p:cNvSpPr>
             <a:spLocks noGrp="1"/>
           </p:cNvSpPr>
@@ -2420,35 +2637,50 @@
             <p:ph type="ftr" sz="quarter" idx="11"/>
           </p:nvPr>
         </p:nvSpPr>
+        <p:spPr>
+          <a:xfrm>
+            <a:off x="4800600" y="6459785"/>
+            <a:ext cx="4648200" cy="365125"/>
+          </a:xfrm>
+        </p:spPr>
+        <p:txBody>
+          <a:bodyPr/>
+          <a:lstStyle>
+            <a:lvl1pPr algn="l">
+              <a:defRPr>
+                <a:solidFill>
+                  <a:schemeClr val="tx2"/>
+                </a:solidFill>
+              </a:defRPr>
+            </a:lvl1pPr>
+          </a:lstStyle>
+          <a:p>
+            <a:endParaRPr lang="en-GB"/>
+          </a:p>
+        </p:txBody>
+      </p:sp>
+      <p:sp>
+        <p:nvSpPr>
+          <p:cNvPr id="7" name="Slide Number Placeholder 6"/>
+          <p:cNvSpPr>
+            <a:spLocks noGrp="1"/>
+          </p:cNvSpPr>
+          <p:nvPr>
+            <p:ph type="sldNum" sz="quarter" idx="12"/>
+          </p:nvPr>
+        </p:nvSpPr>
         <p:spPr/>
         <p:txBody>
           <a:bodyPr/>
-          <a:lstStyle/>
-          <a:p>
-            <a:endParaRPr lang="en-GB"/>
-          </a:p>
-        </p:txBody>
-      </p:sp>
-      <p:sp>
-        <p:nvSpPr>
-          <p:cNvPr id="7" name="Slide Number Placeholder 6">
-            <a:extLst>
-              <a:ext uri="{FF2B5EF4-FFF2-40B4-BE49-F238E27FC236}">
-                <a16:creationId xmlns:a16="http://schemas.microsoft.com/office/drawing/2014/main" id="{C6512CD5-5EC2-48B9-9573-C05156A89BC6}"/>
-              </a:ext>
-            </a:extLst>
-          </p:cNvPr>
-          <p:cNvSpPr>
-            <a:spLocks noGrp="1"/>
-          </p:cNvSpPr>
-          <p:nvPr>
-            <p:ph type="sldNum" sz="quarter" idx="12"/>
-          </p:nvPr>
-        </p:nvSpPr>
-        <p:spPr/>
-        <p:txBody>
-          <a:bodyPr/>
-          <a:lstStyle/>
+          <a:lstStyle>
+            <a:lvl1pPr>
+              <a:defRPr>
+                <a:solidFill>
+                  <a:schemeClr val="tx2"/>
+                </a:solidFill>
+              </a:defRPr>
+            </a:lvl1pPr>
+          </a:lstStyle>
           <a:p>
             <a:fld id="{6BB48138-E494-4E46-AA36-8086418A10D3}" type="slidenum">
               <a:rPr lang="en-GB" smtClean="0"/>
@@ -2461,7 +2693,7 @@
     </p:spTree>
     <p:extLst>
       <p:ext uri="{BB962C8B-B14F-4D97-AF65-F5344CB8AC3E}">
-        <p14:creationId xmlns:p14="http://schemas.microsoft.com/office/powerpoint/2010/main" val="630486921"/>
+        <p14:creationId xmlns:p14="http://schemas.microsoft.com/office/powerpoint/2010/main" val="1125293761"/>
       </p:ext>
     </p:extLst>
   </p:cSld>
@@ -2472,7 +2704,7 @@
 </file>
 
 <file path=ppt/slideLayouts/slideLayout9.xml><?xml version="1.0" encoding="utf-8"?>
-<p:sldLayout xmlns:a="http://schemas.openxmlformats.org/drawingml/2006/main" xmlns:r="http://schemas.openxmlformats.org/officeDocument/2006/relationships" xmlns:p="http://schemas.openxmlformats.org/presentationml/2006/main" type="picTx" preserve="1">
+<p:sldLayout xmlns:a="http://schemas.openxmlformats.org/drawingml/2006/main" xmlns:r="http://schemas.openxmlformats.org/officeDocument/2006/relationships" xmlns:p="http://schemas.openxmlformats.org/presentationml/2006/main" showMasterSp="0" type="picTx" preserve="1">
   <p:cSld name="Picture with Caption">
     <p:spTree>
       <p:nvGrpSpPr>
@@ -2490,13 +2722,83 @@
       </p:grpSpPr>
       <p:sp>
         <p:nvSpPr>
-          <p:cNvPr id="2" name="Title 1">
-            <a:extLst>
-              <a:ext uri="{FF2B5EF4-FFF2-40B4-BE49-F238E27FC236}">
-                <a16:creationId xmlns:a16="http://schemas.microsoft.com/office/drawing/2014/main" id="{F80B047A-45DB-44A7-8217-417B2B147138}"/>
-              </a:ext>
-            </a:extLst>
-          </p:cNvPr>
+          <p:cNvPr id="8" name="Rectangle 7"/>
+          <p:cNvSpPr/>
+          <p:nvPr/>
+        </p:nvSpPr>
+        <p:spPr>
+          <a:xfrm>
+            <a:off x="0" y="4953000"/>
+            <a:ext cx="12188825" cy="1905000"/>
+          </a:xfrm>
+          <a:prstGeom prst="rect">
+            <a:avLst/>
+          </a:prstGeom>
+          <a:solidFill>
+            <a:schemeClr val="accent2"/>
+          </a:solidFill>
+          <a:ln>
+            <a:noFill/>
+          </a:ln>
+        </p:spPr>
+        <p:style>
+          <a:lnRef idx="2">
+            <a:schemeClr val="accent1">
+              <a:shade val="50000"/>
+            </a:schemeClr>
+          </a:lnRef>
+          <a:fillRef idx="1">
+            <a:schemeClr val="accent1"/>
+          </a:fillRef>
+          <a:effectRef idx="0">
+            <a:schemeClr val="accent1"/>
+          </a:effectRef>
+          <a:fontRef idx="minor">
+            <a:schemeClr val="lt1"/>
+          </a:fontRef>
+        </p:style>
+      </p:sp>
+      <p:sp>
+        <p:nvSpPr>
+          <p:cNvPr id="9" name="Rectangle 8"/>
+          <p:cNvSpPr/>
+          <p:nvPr/>
+        </p:nvSpPr>
+        <p:spPr>
+          <a:xfrm>
+            <a:off x="15" y="4915076"/>
+            <a:ext cx="12188825" cy="64008"/>
+          </a:xfrm>
+          <a:prstGeom prst="rect">
+            <a:avLst/>
+          </a:prstGeom>
+          <a:solidFill>
+            <a:schemeClr val="accent1"/>
+          </a:solidFill>
+          <a:ln>
+            <a:noFill/>
+          </a:ln>
+        </p:spPr>
+        <p:style>
+          <a:lnRef idx="2">
+            <a:schemeClr val="accent1">
+              <a:shade val="50000"/>
+            </a:schemeClr>
+          </a:lnRef>
+          <a:fillRef idx="1">
+            <a:schemeClr val="accent1"/>
+          </a:fillRef>
+          <a:effectRef idx="0">
+            <a:schemeClr val="accent1"/>
+          </a:effectRef>
+          <a:fontRef idx="minor">
+            <a:schemeClr val="lt1"/>
+          </a:fontRef>
+        </p:style>
+      </p:sp>
+      <p:sp>
+        <p:nvSpPr>
+          <p:cNvPr id="2" name="Title 1"/>
           <p:cNvSpPr>
             <a:spLocks noGrp="1"/>
           </p:cNvSpPr>
@@ -2506,15 +2808,21 @@
         </p:nvSpPr>
         <p:spPr>
           <a:xfrm>
-            <a:off x="839788" y="457200"/>
-            <a:ext cx="3932237" cy="1600200"/>
-          </a:xfrm>
-        </p:spPr>
-        <p:txBody>
-          <a:bodyPr anchor="b"/>
+            <a:off x="1097280" y="5074920"/>
+            <a:ext cx="10113264" cy="822960"/>
+          </a:xfrm>
+        </p:spPr>
+        <p:txBody>
+          <a:bodyPr lIns="91440" tIns="0" rIns="91440" bIns="0" anchor="b">
+            <a:noAutofit/>
+          </a:bodyPr>
           <a:lstStyle>
             <a:lvl1pPr>
-              <a:defRPr sz="3200"/>
+              <a:defRPr sz="3600" b="0">
+                <a:solidFill>
+                  <a:srgbClr val="FFFFFF"/>
+                </a:solidFill>
+              </a:defRPr>
             </a:lvl1pPr>
           </a:lstStyle>
           <a:p>
@@ -2522,21 +2830,15 @@
               <a:rPr lang="en-US"/>
               <a:t>Click to edit Master title style</a:t>
             </a:r>
-            <a:endParaRPr lang="en-GB"/>
-          </a:p>
-        </p:txBody>
-      </p:sp>
-      <p:sp>
-        <p:nvSpPr>
-          <p:cNvPr id="3" name="Picture Placeholder 2">
-            <a:extLst>
-              <a:ext uri="{FF2B5EF4-FFF2-40B4-BE49-F238E27FC236}">
-                <a16:creationId xmlns:a16="http://schemas.microsoft.com/office/drawing/2014/main" id="{A65F74B3-4FB7-412E-8728-9B875FAAFFD4}"/>
-              </a:ext>
-            </a:extLst>
-          </p:cNvPr>
-          <p:cNvSpPr>
-            <a:spLocks noGrp="1"/>
+            <a:endParaRPr lang="en-US" dirty="0"/>
+          </a:p>
+        </p:txBody>
+      </p:sp>
+      <p:sp>
+        <p:nvSpPr>
+          <p:cNvPr id="3" name="Picture Placeholder 2"/>
+          <p:cNvSpPr>
+            <a:spLocks noGrp="1" noChangeAspect="1"/>
           </p:cNvSpPr>
           <p:nvPr>
             <p:ph type="pic" idx="1"/>
@@ -2544,16 +2846,26 @@
         </p:nvSpPr>
         <p:spPr>
           <a:xfrm>
-            <a:off x="5183188" y="987425"/>
-            <a:ext cx="6172200" cy="4873625"/>
-          </a:xfrm>
-        </p:spPr>
-        <p:txBody>
-          <a:bodyPr/>
+            <a:off x="15" y="0"/>
+            <a:ext cx="12191985" cy="4915076"/>
+          </a:xfrm>
+          <a:blipFill>
+            <a:blip r:embed="rId2"/>
+            <a:stretch>
+              <a:fillRect/>
+            </a:stretch>
+          </a:blipFill>
+        </p:spPr>
+        <p:txBody>
+          <a:bodyPr lIns="457200" tIns="457200" anchor="t"/>
           <a:lstStyle>
             <a:lvl1pPr marL="0" indent="0">
               <a:buNone/>
-              <a:defRPr sz="3200"/>
+              <a:defRPr sz="3200">
+                <a:solidFill>
+                  <a:schemeClr val="bg1"/>
+                </a:solidFill>
+              </a:defRPr>
             </a:lvl1pPr>
             <a:lvl2pPr marL="457200" indent="0">
               <a:buNone/>
@@ -2589,19 +2901,17 @@
             </a:lvl9pPr>
           </a:lstStyle>
           <a:p>
-            <a:endParaRPr lang="en-GB"/>
-          </a:p>
-        </p:txBody>
-      </p:sp>
-      <p:sp>
-        <p:nvSpPr>
-          <p:cNvPr id="4" name="Text Placeholder 3">
-            <a:extLst>
-              <a:ext uri="{FF2B5EF4-FFF2-40B4-BE49-F238E27FC236}">
-                <a16:creationId xmlns:a16="http://schemas.microsoft.com/office/drawing/2014/main" id="{5F56BFC7-19D7-4A57-9EC7-0DFE2C0DCA58}"/>
-              </a:ext>
-            </a:extLst>
-          </p:cNvPr>
+            <a:r>
+              <a:rPr lang="en-US"/>
+              <a:t>Click icon to add picture</a:t>
+            </a:r>
+            <a:endParaRPr lang="en-US" dirty="0"/>
+          </a:p>
+        </p:txBody>
+      </p:sp>
+      <p:sp>
+        <p:nvSpPr>
+          <p:cNvPr id="4" name="Text Placeholder 3"/>
           <p:cNvSpPr>
             <a:spLocks noGrp="1"/>
           </p:cNvSpPr>
@@ -2611,48 +2921,60 @@
         </p:nvSpPr>
         <p:spPr>
           <a:xfrm>
-            <a:off x="839788" y="2057400"/>
-            <a:ext cx="3932237" cy="3811588"/>
-          </a:xfrm>
-        </p:spPr>
-        <p:txBody>
-          <a:bodyPr/>
+            <a:off x="1097280" y="5907023"/>
+            <a:ext cx="10113264" cy="594360"/>
+          </a:xfrm>
+        </p:spPr>
+        <p:txBody>
+          <a:bodyPr lIns="91440" tIns="0" rIns="91440" bIns="0">
+            <a:normAutofit/>
+          </a:bodyPr>
           <a:lstStyle>
             <a:lvl1pPr marL="0" indent="0">
-              <a:buNone/>
-              <a:defRPr sz="1600"/>
+              <a:spcBef>
+                <a:spcPts val="0"/>
+              </a:spcBef>
+              <a:spcAft>
+                <a:spcPts val="600"/>
+              </a:spcAft>
+              <a:buNone/>
+              <a:defRPr sz="1500">
+                <a:solidFill>
+                  <a:srgbClr val="FFFFFF"/>
+                </a:solidFill>
+              </a:defRPr>
             </a:lvl1pPr>
             <a:lvl2pPr marL="457200" indent="0">
               <a:buNone/>
-              <a:defRPr sz="1400"/>
+              <a:defRPr sz="1200"/>
             </a:lvl2pPr>
             <a:lvl3pPr marL="914400" indent="0">
               <a:buNone/>
-              <a:defRPr sz="1200"/>
+              <a:defRPr sz="1000"/>
             </a:lvl3pPr>
             <a:lvl4pPr marL="1371600" indent="0">
               <a:buNone/>
-              <a:defRPr sz="1000"/>
+              <a:defRPr sz="900"/>
             </a:lvl4pPr>
             <a:lvl5pPr marL="1828800" indent="0">
               <a:buNone/>
-              <a:defRPr sz="1000"/>
+              <a:defRPr sz="900"/>
             </a:lvl5pPr>
             <a:lvl6pPr marL="2286000" indent="0">
               <a:buNone/>
-              <a:defRPr sz="1000"/>
+              <a:defRPr sz="900"/>
             </a:lvl6pPr>
             <a:lvl7pPr marL="2743200" indent="0">
               <a:buNone/>
-              <a:defRPr sz="1000"/>
+              <a:defRPr sz="900"/>
             </a:lvl7pPr>
             <a:lvl8pPr marL="3200400" indent="0">
               <a:buNone/>
-              <a:defRPr sz="1000"/>
+              <a:defRPr sz="900"/>
             </a:lvl8pPr>
             <a:lvl9pPr marL="3657600" indent="0">
               <a:buNone/>
-              <a:defRPr sz="1000"/>
+              <a:defRPr sz="900"/>
             </a:lvl9pPr>
           </a:lstStyle>
           <a:p>
@@ -2666,13 +2988,7 @@
       </p:sp>
       <p:sp>
         <p:nvSpPr>
-          <p:cNvPr id="5" name="Date Placeholder 4">
-            <a:extLst>
-              <a:ext uri="{FF2B5EF4-FFF2-40B4-BE49-F238E27FC236}">
-                <a16:creationId xmlns:a16="http://schemas.microsoft.com/office/drawing/2014/main" id="{D7178398-1B64-4E5B-952D-98A8DF2709E3}"/>
-              </a:ext>
-            </a:extLst>
-          </p:cNvPr>
+          <p:cNvPr id="5" name="Date Placeholder 4"/>
           <p:cNvSpPr>
             <a:spLocks noGrp="1"/>
           </p:cNvSpPr>
@@ -2695,13 +3011,7 @@
       </p:sp>
       <p:sp>
         <p:nvSpPr>
-          <p:cNvPr id="6" name="Footer Placeholder 5">
-            <a:extLst>
-              <a:ext uri="{FF2B5EF4-FFF2-40B4-BE49-F238E27FC236}">
-                <a16:creationId xmlns:a16="http://schemas.microsoft.com/office/drawing/2014/main" id="{1897E4CA-68AF-403B-8D75-14E3D1201CA8}"/>
-              </a:ext>
-            </a:extLst>
-          </p:cNvPr>
+          <p:cNvPr id="6" name="Footer Placeholder 5"/>
           <p:cNvSpPr>
             <a:spLocks noGrp="1"/>
           </p:cNvSpPr>
@@ -2720,13 +3030,7 @@
       </p:sp>
       <p:sp>
         <p:nvSpPr>
-          <p:cNvPr id="7" name="Slide Number Placeholder 6">
-            <a:extLst>
-              <a:ext uri="{FF2B5EF4-FFF2-40B4-BE49-F238E27FC236}">
-                <a16:creationId xmlns:a16="http://schemas.microsoft.com/office/drawing/2014/main" id="{851508A6-CAD7-4BF5-8DFD-CFC5352D4422}"/>
-              </a:ext>
-            </a:extLst>
-          </p:cNvPr>
+          <p:cNvPr id="7" name="Slide Number Placeholder 6"/>
           <p:cNvSpPr>
             <a:spLocks noGrp="1"/>
           </p:cNvSpPr>
@@ -2750,7 +3054,7 @@
     </p:spTree>
     <p:extLst>
       <p:ext uri="{BB962C8B-B14F-4D97-AF65-F5344CB8AC3E}">
-        <p14:creationId xmlns:p14="http://schemas.microsoft.com/office/powerpoint/2010/main" val="2461223786"/>
+        <p14:creationId xmlns:p14="http://schemas.microsoft.com/office/powerpoint/2010/main" val="2959844388"/>
       </p:ext>
     </p:extLst>
   </p:cSld>
@@ -2784,31 +3088,101 @@
       </p:grpSpPr>
       <p:sp>
         <p:nvSpPr>
-          <p:cNvPr id="2" name="Title Placeholder 1">
-            <a:extLst>
-              <a:ext uri="{FF2B5EF4-FFF2-40B4-BE49-F238E27FC236}">
-                <a16:creationId xmlns:a16="http://schemas.microsoft.com/office/drawing/2014/main" id="{B2927AFA-1EF8-4F7E-9171-8DE679403E3A}"/>
-              </a:ext>
-            </a:extLst>
-          </p:cNvPr>
-          <p:cNvSpPr>
-            <a:spLocks noGrp="1"/>
-          </p:cNvSpPr>
-          <p:nvPr>
-            <p:ph type="title"/>
-          </p:nvPr>
-        </p:nvSpPr>
-        <p:spPr>
-          <a:xfrm>
-            <a:off x="838200" y="365125"/>
-            <a:ext cx="10515600" cy="1325563"/>
+          <p:cNvPr id="7" name="Rectangle 6"/>
+          <p:cNvSpPr/>
+          <p:nvPr/>
+        </p:nvSpPr>
+        <p:spPr>
+          <a:xfrm>
+            <a:off x="1" y="6400800"/>
+            <a:ext cx="12192000" cy="457200"/>
           </a:xfrm>
           <a:prstGeom prst="rect">
             <a:avLst/>
           </a:prstGeom>
-        </p:spPr>
-        <p:txBody>
-          <a:bodyPr vert="horz" lIns="91440" tIns="45720" rIns="91440" bIns="45720" rtlCol="0" anchor="ctr">
+          <a:solidFill>
+            <a:schemeClr val="accent2"/>
+          </a:solidFill>
+          <a:ln>
+            <a:noFill/>
+          </a:ln>
+        </p:spPr>
+        <p:style>
+          <a:lnRef idx="2">
+            <a:schemeClr val="accent1">
+              <a:shade val="50000"/>
+            </a:schemeClr>
+          </a:lnRef>
+          <a:fillRef idx="1">
+            <a:schemeClr val="accent1"/>
+          </a:fillRef>
+          <a:effectRef idx="0">
+            <a:schemeClr val="accent1"/>
+          </a:effectRef>
+          <a:fontRef idx="minor">
+            <a:schemeClr val="lt1"/>
+          </a:fontRef>
+        </p:style>
+      </p:sp>
+      <p:sp>
+        <p:nvSpPr>
+          <p:cNvPr id="9" name="Rectangle 8"/>
+          <p:cNvSpPr/>
+          <p:nvPr/>
+        </p:nvSpPr>
+        <p:spPr>
+          <a:xfrm>
+            <a:off x="0" y="6334316"/>
+            <a:ext cx="12192001" cy="65998"/>
+          </a:xfrm>
+          <a:prstGeom prst="rect">
+            <a:avLst/>
+          </a:prstGeom>
+          <a:solidFill>
+            <a:schemeClr val="accent1"/>
+          </a:solidFill>
+          <a:ln>
+            <a:noFill/>
+          </a:ln>
+        </p:spPr>
+        <p:style>
+          <a:lnRef idx="2">
+            <a:schemeClr val="accent1">
+              <a:shade val="50000"/>
+            </a:schemeClr>
+          </a:lnRef>
+          <a:fillRef idx="1">
+            <a:schemeClr val="accent1"/>
+          </a:fillRef>
+          <a:effectRef idx="0">
+            <a:schemeClr val="accent1"/>
+          </a:effectRef>
+          <a:fontRef idx="minor">
+            <a:schemeClr val="lt1"/>
+          </a:fontRef>
+        </p:style>
+      </p:sp>
+      <p:sp>
+        <p:nvSpPr>
+          <p:cNvPr id="2" name="Title Placeholder 1"/>
+          <p:cNvSpPr>
+            <a:spLocks noGrp="1"/>
+          </p:cNvSpPr>
+          <p:nvPr>
+            <p:ph type="title"/>
+          </p:nvPr>
+        </p:nvSpPr>
+        <p:spPr>
+          <a:xfrm>
+            <a:off x="1097280" y="286603"/>
+            <a:ext cx="10058400" cy="1450757"/>
+          </a:xfrm>
+          <a:prstGeom prst="rect">
+            <a:avLst/>
+          </a:prstGeom>
+        </p:spPr>
+        <p:txBody>
+          <a:bodyPr vert="horz" lIns="91440" tIns="45720" rIns="91440" bIns="45720" rtlCol="0" anchor="b">
             <a:normAutofit/>
           </a:bodyPr>
           <a:lstStyle/>
@@ -2817,19 +3191,13 @@
               <a:rPr lang="en-US"/>
               <a:t>Click to edit Master title style</a:t>
             </a:r>
-            <a:endParaRPr lang="en-GB"/>
-          </a:p>
-        </p:txBody>
-      </p:sp>
-      <p:sp>
-        <p:nvSpPr>
-          <p:cNvPr id="3" name="Text Placeholder 2">
-            <a:extLst>
-              <a:ext uri="{FF2B5EF4-FFF2-40B4-BE49-F238E27FC236}">
-                <a16:creationId xmlns:a16="http://schemas.microsoft.com/office/drawing/2014/main" id="{4D15951A-0C5C-478D-B460-0EE28D86BEDC}"/>
-              </a:ext>
-            </a:extLst>
-          </p:cNvPr>
+            <a:endParaRPr lang="en-US" dirty="0"/>
+          </a:p>
+        </p:txBody>
+      </p:sp>
+      <p:sp>
+        <p:nvSpPr>
+          <p:cNvPr id="3" name="Text Placeholder 2"/>
           <p:cNvSpPr>
             <a:spLocks noGrp="1"/>
           </p:cNvSpPr>
@@ -2839,15 +3207,15 @@
         </p:nvSpPr>
         <p:spPr>
           <a:xfrm>
-            <a:off x="838200" y="1825625"/>
-            <a:ext cx="10515600" cy="4351338"/>
+            <a:off x="1097280" y="1845734"/>
+            <a:ext cx="10058400" cy="4023360"/>
           </a:xfrm>
           <a:prstGeom prst="rect">
             <a:avLst/>
           </a:prstGeom>
         </p:spPr>
         <p:txBody>
-          <a:bodyPr vert="horz" lIns="91440" tIns="45720" rIns="91440" bIns="45720" rtlCol="0">
+          <a:bodyPr vert="horz" lIns="0" tIns="45720" rIns="0" bIns="45720" rtlCol="0">
             <a:normAutofit/>
           </a:bodyPr>
           <a:lstStyle/>
@@ -2885,19 +3253,13 @@
               <a:rPr lang="en-US"/>
               <a:t>Fifth level</a:t>
             </a:r>
-            <a:endParaRPr lang="en-GB"/>
-          </a:p>
-        </p:txBody>
-      </p:sp>
-      <p:sp>
-        <p:nvSpPr>
-          <p:cNvPr id="4" name="Date Placeholder 3">
-            <a:extLst>
-              <a:ext uri="{FF2B5EF4-FFF2-40B4-BE49-F238E27FC236}">
-                <a16:creationId xmlns:a16="http://schemas.microsoft.com/office/drawing/2014/main" id="{FAE9A9D2-28E6-40F5-8515-31C5729C1B33}"/>
-              </a:ext>
-            </a:extLst>
-          </p:cNvPr>
+            <a:endParaRPr lang="en-US" dirty="0"/>
+          </a:p>
+        </p:txBody>
+      </p:sp>
+      <p:sp>
+        <p:nvSpPr>
+          <p:cNvPr id="4" name="Date Placeholder 3"/>
           <p:cNvSpPr>
             <a:spLocks noGrp="1"/>
           </p:cNvSpPr>
@@ -2907,8 +3269,8 @@
         </p:nvSpPr>
         <p:spPr>
           <a:xfrm>
-            <a:off x="838200" y="6356350"/>
-            <a:ext cx="2743200" cy="365125"/>
+            <a:off x="1097280" y="6459785"/>
+            <a:ext cx="2472271" cy="365125"/>
           </a:xfrm>
           <a:prstGeom prst="rect">
             <a:avLst/>
@@ -2918,11 +3280,9 @@
           <a:bodyPr vert="horz" lIns="91440" tIns="45720" rIns="91440" bIns="45720" rtlCol="0" anchor="ctr"/>
           <a:lstStyle>
             <a:lvl1pPr algn="l">
-              <a:defRPr sz="1200">
+              <a:defRPr sz="900">
                 <a:solidFill>
-                  <a:schemeClr val="tx1">
-                    <a:tint val="75000"/>
-                  </a:schemeClr>
+                  <a:srgbClr val="FFFFFF"/>
                 </a:solidFill>
               </a:defRPr>
             </a:lvl1pPr>
@@ -2938,13 +3298,7 @@
       </p:sp>
       <p:sp>
         <p:nvSpPr>
-          <p:cNvPr id="5" name="Footer Placeholder 4">
-            <a:extLst>
-              <a:ext uri="{FF2B5EF4-FFF2-40B4-BE49-F238E27FC236}">
-                <a16:creationId xmlns:a16="http://schemas.microsoft.com/office/drawing/2014/main" id="{A64513B4-2FC1-4CAE-83BB-5230B1D8AC5A}"/>
-              </a:ext>
-            </a:extLst>
-          </p:cNvPr>
+          <p:cNvPr id="5" name="Footer Placeholder 4"/>
           <p:cNvSpPr>
             <a:spLocks noGrp="1"/>
           </p:cNvSpPr>
@@ -2954,8 +3308,8 @@
         </p:nvSpPr>
         <p:spPr>
           <a:xfrm>
-            <a:off x="4038600" y="6356350"/>
-            <a:ext cx="4114800" cy="365125"/>
+            <a:off x="3686185" y="6459785"/>
+            <a:ext cx="4822804" cy="365125"/>
           </a:xfrm>
           <a:prstGeom prst="rect">
             <a:avLst/>
@@ -2965,11 +3319,9 @@
           <a:bodyPr vert="horz" lIns="91440" tIns="45720" rIns="91440" bIns="45720" rtlCol="0" anchor="ctr"/>
           <a:lstStyle>
             <a:lvl1pPr algn="ctr">
-              <a:defRPr sz="1200">
+              <a:defRPr sz="900" cap="all" baseline="0">
                 <a:solidFill>
-                  <a:schemeClr val="tx1">
-                    <a:tint val="75000"/>
-                  </a:schemeClr>
+                  <a:srgbClr val="FFFFFF"/>
                 </a:solidFill>
               </a:defRPr>
             </a:lvl1pPr>
@@ -2981,13 +3333,7 @@
       </p:sp>
       <p:sp>
         <p:nvSpPr>
-          <p:cNvPr id="6" name="Slide Number Placeholder 5">
-            <a:extLst>
-              <a:ext uri="{FF2B5EF4-FFF2-40B4-BE49-F238E27FC236}">
-                <a16:creationId xmlns:a16="http://schemas.microsoft.com/office/drawing/2014/main" id="{2E49EF19-DB4B-4B1F-9CFD-6F017EC5E007}"/>
-              </a:ext>
-            </a:extLst>
-          </p:cNvPr>
+          <p:cNvPr id="6" name="Slide Number Placeholder 5"/>
           <p:cNvSpPr>
             <a:spLocks noGrp="1"/>
           </p:cNvSpPr>
@@ -2997,8 +3343,8 @@
         </p:nvSpPr>
         <p:spPr>
           <a:xfrm>
-            <a:off x="8610600" y="6356350"/>
-            <a:ext cx="2743200" cy="365125"/>
+            <a:off x="9900458" y="6459785"/>
+            <a:ext cx="1312025" cy="365125"/>
           </a:xfrm>
           <a:prstGeom prst="rect">
             <a:avLst/>
@@ -3008,11 +3354,9 @@
           <a:bodyPr vert="horz" lIns="91440" tIns="45720" rIns="91440" bIns="45720" rtlCol="0" anchor="ctr"/>
           <a:lstStyle>
             <a:lvl1pPr algn="r">
-              <a:defRPr sz="1200">
+              <a:defRPr sz="1050">
                 <a:solidFill>
-                  <a:schemeClr val="tx1">
-                    <a:tint val="75000"/>
-                  </a:schemeClr>
+                  <a:srgbClr val="FFFFFF"/>
                 </a:solidFill>
               </a:defRPr>
             </a:lvl1pPr>
@@ -3026,40 +3370,81 @@
           </a:p>
         </p:txBody>
       </p:sp>
+      <p:cxnSp>
+        <p:nvCxnSpPr>
+          <p:cNvPr id="10" name="Straight Connector 9"/>
+          <p:cNvCxnSpPr/>
+          <p:nvPr/>
+        </p:nvCxnSpPr>
+        <p:spPr>
+          <a:xfrm>
+            <a:off x="1193532" y="1737845"/>
+            <a:ext cx="9966960" cy="0"/>
+          </a:xfrm>
+          <a:prstGeom prst="line">
+            <a:avLst/>
+          </a:prstGeom>
+          <a:ln w="6350">
+            <a:solidFill>
+              <a:schemeClr val="tx1">
+                <a:lumMod val="50000"/>
+                <a:lumOff val="50000"/>
+              </a:schemeClr>
+            </a:solidFill>
+          </a:ln>
+        </p:spPr>
+        <p:style>
+          <a:lnRef idx="1">
+            <a:schemeClr val="accent1"/>
+          </a:lnRef>
+          <a:fillRef idx="0">
+            <a:schemeClr val="accent1"/>
+          </a:fillRef>
+          <a:effectRef idx="0">
+            <a:schemeClr val="accent1"/>
+          </a:effectRef>
+          <a:fontRef idx="minor">
+            <a:schemeClr val="tx1"/>
+          </a:fontRef>
+        </p:style>
+      </p:cxnSp>
     </p:spTree>
     <p:extLst>
       <p:ext uri="{BB962C8B-B14F-4D97-AF65-F5344CB8AC3E}">
-        <p14:creationId xmlns:p14="http://schemas.microsoft.com/office/powerpoint/2010/main" val="2338257149"/>
+        <p14:creationId xmlns:p14="http://schemas.microsoft.com/office/powerpoint/2010/main" val="2689093720"/>
       </p:ext>
     </p:extLst>
   </p:cSld>
   <p:clrMap bg1="lt1" tx1="dk1" bg2="lt2" tx2="dk2" accent1="accent1" accent2="accent2" accent3="accent3" accent4="accent4" accent5="accent5" accent6="accent6" hlink="hlink" folHlink="folHlink"/>
   <p:sldLayoutIdLst>
-    <p:sldLayoutId id="2147483649" r:id="rId1"/>
-    <p:sldLayoutId id="2147483650" r:id="rId2"/>
-    <p:sldLayoutId id="2147483651" r:id="rId3"/>
-    <p:sldLayoutId id="2147483652" r:id="rId4"/>
-    <p:sldLayoutId id="2147483653" r:id="rId5"/>
-    <p:sldLayoutId id="2147483654" r:id="rId6"/>
-    <p:sldLayoutId id="2147483655" r:id="rId7"/>
-    <p:sldLayoutId id="2147483656" r:id="rId8"/>
-    <p:sldLayoutId id="2147483657" r:id="rId9"/>
-    <p:sldLayoutId id="2147483658" r:id="rId10"/>
-    <p:sldLayoutId id="2147483659" r:id="rId11"/>
+    <p:sldLayoutId id="2147483834" r:id="rId1"/>
+    <p:sldLayoutId id="2147483835" r:id="rId2"/>
+    <p:sldLayoutId id="2147483836" r:id="rId3"/>
+    <p:sldLayoutId id="2147483837" r:id="rId4"/>
+    <p:sldLayoutId id="2147483838" r:id="rId5"/>
+    <p:sldLayoutId id="2147483839" r:id="rId6"/>
+    <p:sldLayoutId id="2147483840" r:id="rId7"/>
+    <p:sldLayoutId id="2147483841" r:id="rId8"/>
+    <p:sldLayoutId id="2147483842" r:id="rId9"/>
+    <p:sldLayoutId id="2147483843" r:id="rId10"/>
+    <p:sldLayoutId id="2147483844" r:id="rId11"/>
   </p:sldLayoutIdLst>
   <p:txStyles>
     <p:titleStyle>
       <a:lvl1pPr algn="l" defTabSz="914400" rtl="0" eaLnBrk="1" latinLnBrk="0" hangingPunct="1">
         <a:lnSpc>
-          <a:spcPct val="90000"/>
+          <a:spcPct val="85000"/>
         </a:lnSpc>
         <a:spcBef>
           <a:spcPct val="0"/>
         </a:spcBef>
         <a:buNone/>
-        <a:defRPr sz="4400" kern="1200">
+        <a:defRPr sz="4800" kern="1200" spc="-50" baseline="0">
           <a:solidFill>
-            <a:schemeClr val="tx1"/>
+            <a:schemeClr val="tx1">
+              <a:lumMod val="75000"/>
+              <a:lumOff val="25000"/>
+            </a:schemeClr>
           </a:solidFill>
           <a:latin typeface="+mj-lt"/>
           <a:ea typeface="+mj-ea"/>
@@ -3068,162 +3453,244 @@
       </a:lvl1pPr>
     </p:titleStyle>
     <p:bodyStyle>
-      <a:lvl1pPr marL="228600" indent="-228600" algn="l" defTabSz="914400" rtl="0" eaLnBrk="1" latinLnBrk="0" hangingPunct="1">
+      <a:lvl1pPr marL="91440" indent="-91440" algn="l" defTabSz="914400" rtl="0" eaLnBrk="1" latinLnBrk="0" hangingPunct="1">
         <a:lnSpc>
           <a:spcPct val="90000"/>
         </a:lnSpc>
         <a:spcBef>
-          <a:spcPts val="1000"/>
+          <a:spcPts val="1200"/>
         </a:spcBef>
-        <a:buFont typeface="Arial" panose="020B0604020202020204" pitchFamily="34" charset="0"/>
-        <a:buChar char="•"/>
-        <a:defRPr sz="2800" kern="1200">
+        <a:spcAft>
+          <a:spcPts val="200"/>
+        </a:spcAft>
+        <a:buClr>
+          <a:schemeClr val="accent1"/>
+        </a:buClr>
+        <a:buSzPct val="100000"/>
+        <a:buFont typeface="Calibri" panose="020F0502020204030204" pitchFamily="34" charset="0"/>
+        <a:buChar char=" "/>
+        <a:defRPr sz="2000" kern="1200">
           <a:solidFill>
-            <a:schemeClr val="tx1"/>
+            <a:schemeClr val="tx1">
+              <a:lumMod val="75000"/>
+              <a:lumOff val="25000"/>
+            </a:schemeClr>
           </a:solidFill>
           <a:latin typeface="+mn-lt"/>
           <a:ea typeface="+mn-ea"/>
           <a:cs typeface="+mn-cs"/>
         </a:defRPr>
       </a:lvl1pPr>
-      <a:lvl2pPr marL="685800" indent="-228600" algn="l" defTabSz="914400" rtl="0" eaLnBrk="1" latinLnBrk="0" hangingPunct="1">
+      <a:lvl2pPr marL="384048" indent="-182880" algn="l" defTabSz="914400" rtl="0" eaLnBrk="1" latinLnBrk="0" hangingPunct="1">
         <a:lnSpc>
           <a:spcPct val="90000"/>
         </a:lnSpc>
         <a:spcBef>
-          <a:spcPts val="500"/>
+          <a:spcPts val="200"/>
         </a:spcBef>
-        <a:buFont typeface="Arial" panose="020B0604020202020204" pitchFamily="34" charset="0"/>
-        <a:buChar char="•"/>
-        <a:defRPr sz="2400" kern="1200">
+        <a:spcAft>
+          <a:spcPts val="400"/>
+        </a:spcAft>
+        <a:buClr>
+          <a:schemeClr val="accent1"/>
+        </a:buClr>
+        <a:buFont typeface="Calibri" pitchFamily="34" charset="0"/>
+        <a:buChar char="◦"/>
+        <a:defRPr sz="1800" kern="1200">
           <a:solidFill>
-            <a:schemeClr val="tx1"/>
+            <a:schemeClr val="tx1">
+              <a:lumMod val="75000"/>
+              <a:lumOff val="25000"/>
+            </a:schemeClr>
           </a:solidFill>
           <a:latin typeface="+mn-lt"/>
           <a:ea typeface="+mn-ea"/>
           <a:cs typeface="+mn-cs"/>
         </a:defRPr>
       </a:lvl2pPr>
-      <a:lvl3pPr marL="1143000" indent="-228600" algn="l" defTabSz="914400" rtl="0" eaLnBrk="1" latinLnBrk="0" hangingPunct="1">
+      <a:lvl3pPr marL="566928" indent="-182880" algn="l" defTabSz="914400" rtl="0" eaLnBrk="1" latinLnBrk="0" hangingPunct="1">
         <a:lnSpc>
           <a:spcPct val="90000"/>
         </a:lnSpc>
         <a:spcBef>
-          <a:spcPts val="500"/>
+          <a:spcPts val="200"/>
         </a:spcBef>
-        <a:buFont typeface="Arial" panose="020B0604020202020204" pitchFamily="34" charset="0"/>
-        <a:buChar char="•"/>
-        <a:defRPr sz="2000" kern="1200">
+        <a:spcAft>
+          <a:spcPts val="400"/>
+        </a:spcAft>
+        <a:buClr>
+          <a:schemeClr val="accent1"/>
+        </a:buClr>
+        <a:buFont typeface="Calibri" pitchFamily="34" charset="0"/>
+        <a:buChar char="◦"/>
+        <a:defRPr sz="1400" kern="1200">
           <a:solidFill>
-            <a:schemeClr val="tx1"/>
+            <a:schemeClr val="tx1">
+              <a:lumMod val="75000"/>
+              <a:lumOff val="25000"/>
+            </a:schemeClr>
           </a:solidFill>
           <a:latin typeface="+mn-lt"/>
           <a:ea typeface="+mn-ea"/>
           <a:cs typeface="+mn-cs"/>
         </a:defRPr>
       </a:lvl3pPr>
-      <a:lvl4pPr marL="1600200" indent="-228600" algn="l" defTabSz="914400" rtl="0" eaLnBrk="1" latinLnBrk="0" hangingPunct="1">
+      <a:lvl4pPr marL="749808" indent="-182880" algn="l" defTabSz="914400" rtl="0" eaLnBrk="1" latinLnBrk="0" hangingPunct="1">
         <a:lnSpc>
           <a:spcPct val="90000"/>
         </a:lnSpc>
         <a:spcBef>
-          <a:spcPts val="500"/>
+          <a:spcPts val="200"/>
         </a:spcBef>
-        <a:buFont typeface="Arial" panose="020B0604020202020204" pitchFamily="34" charset="0"/>
-        <a:buChar char="•"/>
-        <a:defRPr sz="1800" kern="1200">
+        <a:spcAft>
+          <a:spcPts val="400"/>
+        </a:spcAft>
+        <a:buClr>
+          <a:schemeClr val="accent1"/>
+        </a:buClr>
+        <a:buFont typeface="Calibri" pitchFamily="34" charset="0"/>
+        <a:buChar char="◦"/>
+        <a:defRPr sz="1400" kern="1200">
           <a:solidFill>
-            <a:schemeClr val="tx1"/>
+            <a:schemeClr val="tx1">
+              <a:lumMod val="75000"/>
+              <a:lumOff val="25000"/>
+            </a:schemeClr>
           </a:solidFill>
           <a:latin typeface="+mn-lt"/>
           <a:ea typeface="+mn-ea"/>
           <a:cs typeface="+mn-cs"/>
         </a:defRPr>
       </a:lvl4pPr>
-      <a:lvl5pPr marL="2057400" indent="-228600" algn="l" defTabSz="914400" rtl="0" eaLnBrk="1" latinLnBrk="0" hangingPunct="1">
+      <a:lvl5pPr marL="932688" indent="-182880" algn="l" defTabSz="914400" rtl="0" eaLnBrk="1" latinLnBrk="0" hangingPunct="1">
         <a:lnSpc>
           <a:spcPct val="90000"/>
         </a:lnSpc>
         <a:spcBef>
-          <a:spcPts val="500"/>
+          <a:spcPts val="200"/>
         </a:spcBef>
-        <a:buFont typeface="Arial" panose="020B0604020202020204" pitchFamily="34" charset="0"/>
-        <a:buChar char="•"/>
-        <a:defRPr sz="1800" kern="1200">
+        <a:spcAft>
+          <a:spcPts val="400"/>
+        </a:spcAft>
+        <a:buClr>
+          <a:schemeClr val="accent1"/>
+        </a:buClr>
+        <a:buFont typeface="Calibri" pitchFamily="34" charset="0"/>
+        <a:buChar char="◦"/>
+        <a:defRPr sz="1400" kern="1200">
           <a:solidFill>
-            <a:schemeClr val="tx1"/>
+            <a:schemeClr val="tx1">
+              <a:lumMod val="75000"/>
+              <a:lumOff val="25000"/>
+            </a:schemeClr>
           </a:solidFill>
           <a:latin typeface="+mn-lt"/>
           <a:ea typeface="+mn-ea"/>
           <a:cs typeface="+mn-cs"/>
         </a:defRPr>
       </a:lvl5pPr>
-      <a:lvl6pPr marL="2514600" indent="-228600" algn="l" defTabSz="914400" rtl="0" eaLnBrk="1" latinLnBrk="0" hangingPunct="1">
+      <a:lvl6pPr marL="1100000" indent="-228600" algn="l" defTabSz="914400" rtl="0" eaLnBrk="1" latinLnBrk="0" hangingPunct="1">
         <a:lnSpc>
           <a:spcPct val="90000"/>
         </a:lnSpc>
         <a:spcBef>
-          <a:spcPts val="500"/>
+          <a:spcPts val="200"/>
         </a:spcBef>
-        <a:buFont typeface="Arial" panose="020B0604020202020204" pitchFamily="34" charset="0"/>
-        <a:buChar char="•"/>
-        <a:defRPr sz="1800" kern="1200">
+        <a:spcAft>
+          <a:spcPts val="400"/>
+        </a:spcAft>
+        <a:buClr>
+          <a:schemeClr val="accent1"/>
+        </a:buClr>
+        <a:buFont typeface="Calibri" pitchFamily="34" charset="0"/>
+        <a:buChar char="◦"/>
+        <a:defRPr sz="1400" kern="1200">
           <a:solidFill>
-            <a:schemeClr val="tx1"/>
+            <a:schemeClr val="tx1">
+              <a:lumMod val="75000"/>
+              <a:lumOff val="25000"/>
+            </a:schemeClr>
           </a:solidFill>
           <a:latin typeface="+mn-lt"/>
           <a:ea typeface="+mn-ea"/>
           <a:cs typeface="+mn-cs"/>
         </a:defRPr>
       </a:lvl6pPr>
-      <a:lvl7pPr marL="2971800" indent="-228600" algn="l" defTabSz="914400" rtl="0" eaLnBrk="1" latinLnBrk="0" hangingPunct="1">
+      <a:lvl7pPr marL="1300000" indent="-228600" algn="l" defTabSz="914400" rtl="0" eaLnBrk="1" latinLnBrk="0" hangingPunct="1">
         <a:lnSpc>
           <a:spcPct val="90000"/>
         </a:lnSpc>
         <a:spcBef>
-          <a:spcPts val="500"/>
+          <a:spcPts val="200"/>
         </a:spcBef>
-        <a:buFont typeface="Arial" panose="020B0604020202020204" pitchFamily="34" charset="0"/>
-        <a:buChar char="•"/>
-        <a:defRPr sz="1800" kern="1200">
+        <a:spcAft>
+          <a:spcPts val="400"/>
+        </a:spcAft>
+        <a:buClr>
+          <a:schemeClr val="accent1"/>
+        </a:buClr>
+        <a:buFont typeface="Calibri" pitchFamily="34" charset="0"/>
+        <a:buChar char="◦"/>
+        <a:defRPr sz="1400" kern="1200">
           <a:solidFill>
-            <a:schemeClr val="tx1"/>
+            <a:schemeClr val="tx1">
+              <a:lumMod val="75000"/>
+              <a:lumOff val="25000"/>
+            </a:schemeClr>
           </a:solidFill>
           <a:latin typeface="+mn-lt"/>
           <a:ea typeface="+mn-ea"/>
           <a:cs typeface="+mn-cs"/>
         </a:defRPr>
       </a:lvl7pPr>
-      <a:lvl8pPr marL="3429000" indent="-228600" algn="l" defTabSz="914400" rtl="0" eaLnBrk="1" latinLnBrk="0" hangingPunct="1">
+      <a:lvl8pPr marL="1500000" indent="-228600" algn="l" defTabSz="914400" rtl="0" eaLnBrk="1" latinLnBrk="0" hangingPunct="1">
         <a:lnSpc>
           <a:spcPct val="90000"/>
         </a:lnSpc>
         <a:spcBef>
-          <a:spcPts val="500"/>
+          <a:spcPts val="200"/>
         </a:spcBef>
-        <a:buFont typeface="Arial" panose="020B0604020202020204" pitchFamily="34" charset="0"/>
-        <a:buChar char="•"/>
-        <a:defRPr sz="1800" kern="1200">
+        <a:spcAft>
+          <a:spcPts val="400"/>
+        </a:spcAft>
+        <a:buClr>
+          <a:schemeClr val="accent1"/>
+        </a:buClr>
+        <a:buFont typeface="Calibri" pitchFamily="34" charset="0"/>
+        <a:buChar char="◦"/>
+        <a:defRPr sz="1400" kern="1200">
           <a:solidFill>
-            <a:schemeClr val="tx1"/>
+            <a:schemeClr val="tx1">
+              <a:lumMod val="75000"/>
+              <a:lumOff val="25000"/>
+            </a:schemeClr>
           </a:solidFill>
           <a:latin typeface="+mn-lt"/>
           <a:ea typeface="+mn-ea"/>
           <a:cs typeface="+mn-cs"/>
         </a:defRPr>
       </a:lvl8pPr>
-      <a:lvl9pPr marL="3886200" indent="-228600" algn="l" defTabSz="914400" rtl="0" eaLnBrk="1" latinLnBrk="0" hangingPunct="1">
+      <a:lvl9pPr marL="1700000" indent="-228600" algn="l" defTabSz="914400" rtl="0" eaLnBrk="1" latinLnBrk="0" hangingPunct="1">
         <a:lnSpc>
           <a:spcPct val="90000"/>
         </a:lnSpc>
         <a:spcBef>
-          <a:spcPts val="500"/>
+          <a:spcPts val="200"/>
         </a:spcBef>
-        <a:buFont typeface="Arial" panose="020B0604020202020204" pitchFamily="34" charset="0"/>
-        <a:buChar char="•"/>
-        <a:defRPr sz="1800" kern="1200">
+        <a:spcAft>
+          <a:spcPts val="400"/>
+        </a:spcAft>
+        <a:buClr>
+          <a:schemeClr val="accent1"/>
+        </a:buClr>
+        <a:buFont typeface="Calibri" pitchFamily="34" charset="0"/>
+        <a:buChar char="◦"/>
+        <a:defRPr sz="1400" kern="1200">
           <a:solidFill>
-            <a:schemeClr val="tx1"/>
+            <a:schemeClr val="tx1">
+              <a:lumMod val="75000"/>
+              <a:lumOff val="25000"/>
+            </a:schemeClr>
           </a:solidFill>
           <a:latin typeface="+mn-lt"/>
           <a:ea typeface="+mn-ea"/>
@@ -3445,7 +3912,7 @@
         </p:nvSpPr>
         <p:spPr>
           <a:xfrm>
-            <a:off x="963169" y="648025"/>
+            <a:off x="1581475" y="652238"/>
             <a:ext cx="4479721" cy="2862322"/>
           </a:xfrm>
           <a:prstGeom prst="rect">
@@ -3565,7 +4032,7 @@
         </p:blipFill>
         <p:spPr>
           <a:xfrm>
-            <a:off x="5024457" y="2510657"/>
+            <a:off x="5518979" y="2666924"/>
             <a:ext cx="3276600" cy="1390650"/>
           </a:xfrm>
           <a:prstGeom prst="rect">
@@ -3601,7 +4068,7 @@
         </p:blipFill>
         <p:spPr>
           <a:xfrm>
-            <a:off x="9504178" y="2705159"/>
+            <a:off x="9825661" y="2222291"/>
             <a:ext cx="2143125" cy="2143125"/>
           </a:xfrm>
           <a:prstGeom prst="rect">
@@ -3637,7 +4104,7 @@
         </p:blipFill>
         <p:spPr>
           <a:xfrm>
-            <a:off x="8927077" y="1275530"/>
+            <a:off x="9146990" y="483199"/>
             <a:ext cx="2857500" cy="1600200"/>
           </a:xfrm>
           <a:prstGeom prst="rect">
@@ -3673,7 +4140,7 @@
         </p:blipFill>
         <p:spPr>
           <a:xfrm>
-            <a:off x="5766474" y="648025"/>
+            <a:off x="6061196" y="648025"/>
             <a:ext cx="2857500" cy="1600200"/>
           </a:xfrm>
           <a:prstGeom prst="rect">
@@ -3709,7 +4176,7 @@
         </p:blipFill>
         <p:spPr>
           <a:xfrm>
-            <a:off x="3697815" y="4695500"/>
+            <a:off x="3679154" y="4557785"/>
             <a:ext cx="3028950" cy="1514475"/>
           </a:xfrm>
           <a:prstGeom prst="rect">
@@ -3781,7 +4248,7 @@
         </p:blipFill>
         <p:spPr>
           <a:xfrm>
-            <a:off x="6881986" y="4429619"/>
+            <a:off x="7573700" y="4262911"/>
             <a:ext cx="3473841" cy="2046235"/>
           </a:xfrm>
           <a:prstGeom prst="rect">
@@ -3833,7 +4300,7 @@
         </p:nvSpPr>
         <p:spPr>
           <a:xfrm>
-            <a:off x="947928" y="667512"/>
+            <a:off x="1591740" y="648850"/>
             <a:ext cx="5084064" cy="3693319"/>
           </a:xfrm>
           <a:prstGeom prst="rect">
@@ -3955,6 +4422,44 @@
           </a:p>
         </p:txBody>
       </p:sp>
+      <p:pic>
+        <p:nvPicPr>
+          <p:cNvPr id="3" name="Video">
+            <a:hlinkClick r:id="" action="ppaction://media"/>
+            <a:extLst>
+              <a:ext uri="{FF2B5EF4-FFF2-40B4-BE49-F238E27FC236}">
+                <a16:creationId xmlns:a16="http://schemas.microsoft.com/office/drawing/2014/main" id="{7FED8495-9702-4611-9F1A-0465B3C88A78}"/>
+              </a:ext>
+            </a:extLst>
+          </p:cNvPr>
+          <p:cNvPicPr>
+            <a:picLocks noChangeAspect="1"/>
+          </p:cNvPicPr>
+          <p:nvPr>
+            <a:videoFile r:link="rId2"/>
+            <p:extLst>
+              <p:ext uri="{DAA4B4D4-6D71-4841-9C94-3DE7FCFB9230}">
+                <p14:media xmlns:p14="http://schemas.microsoft.com/office/powerpoint/2010/main" r:embed="rId1"/>
+              </p:ext>
+            </p:extLst>
+          </p:nvPr>
+        </p:nvPicPr>
+        <p:blipFill>
+          <a:blip r:embed="rId4"/>
+          <a:stretch>
+            <a:fillRect/>
+          </a:stretch>
+        </p:blipFill>
+        <p:spPr>
+          <a:xfrm>
+            <a:off x="7113864" y="360838"/>
+            <a:ext cx="3048000" cy="5410200"/>
+          </a:xfrm>
+          <a:prstGeom prst="rect">
+            <a:avLst/>
+          </a:prstGeom>
+        </p:spPr>
+      </p:pic>
     </p:spTree>
     <p:extLst>
       <p:ext uri="{BB962C8B-B14F-4D97-AF65-F5344CB8AC3E}">
@@ -3965,6 +4470,141 @@
   <p:clrMapOvr>
     <a:masterClrMapping/>
   </p:clrMapOvr>
+  <p:timing>
+    <p:tnLst>
+      <p:par>
+        <p:cTn id="1" dur="indefinite" restart="never" nodeType="tmRoot">
+          <p:childTnLst>
+            <p:seq concurrent="1" nextAc="seek">
+              <p:cTn id="2" dur="indefinite" nodeType="mainSeq">
+                <p:childTnLst>
+                  <p:par>
+                    <p:cTn id="3" fill="hold">
+                      <p:stCondLst>
+                        <p:cond delay="indefinite"/>
+                      </p:stCondLst>
+                      <p:childTnLst>
+                        <p:par>
+                          <p:cTn id="4" fill="hold">
+                            <p:stCondLst>
+                              <p:cond delay="0"/>
+                            </p:stCondLst>
+                            <p:childTnLst>
+                              <p:par>
+                                <p:cTn id="5" presetID="1" presetClass="mediacall" presetSubtype="0" fill="hold" nodeType="clickEffect">
+                                  <p:stCondLst>
+                                    <p:cond delay="0"/>
+                                  </p:stCondLst>
+                                  <p:childTnLst>
+                                    <p:cmd type="call" cmd="playFrom(0.0)">
+                                      <p:cBhvr>
+                                        <p:cTn id="6" dur="8206" fill="hold"/>
+                                        <p:tgtEl>
+                                          <p:spTgt spid="3"/>
+                                        </p:tgtEl>
+                                      </p:cBhvr>
+                                    </p:cmd>
+                                  </p:childTnLst>
+                                </p:cTn>
+                              </p:par>
+                            </p:childTnLst>
+                          </p:cTn>
+                        </p:par>
+                      </p:childTnLst>
+                    </p:cTn>
+                  </p:par>
+                </p:childTnLst>
+              </p:cTn>
+              <p:prevCondLst>
+                <p:cond evt="onPrev" delay="0">
+                  <p:tgtEl>
+                    <p:sldTgt/>
+                  </p:tgtEl>
+                </p:cond>
+              </p:prevCondLst>
+              <p:nextCondLst>
+                <p:cond evt="onNext" delay="0">
+                  <p:tgtEl>
+                    <p:sldTgt/>
+                  </p:tgtEl>
+                </p:cond>
+              </p:nextCondLst>
+            </p:seq>
+            <p:video>
+              <p:cMediaNode vol="100000">
+                <p:cTn id="7" fill="hold" display="0">
+                  <p:stCondLst>
+                    <p:cond delay="indefinite"/>
+                  </p:stCondLst>
+                </p:cTn>
+                <p:tgtEl>
+                  <p:spTgt spid="3"/>
+                </p:tgtEl>
+              </p:cMediaNode>
+            </p:video>
+            <p:seq concurrent="1" nextAc="seek">
+              <p:cTn id="8" restart="whenNotActive" fill="hold" evtFilter="cancelBubble" nodeType="interactiveSeq">
+                <p:stCondLst>
+                  <p:cond evt="onClick" delay="0">
+                    <p:tgtEl>
+                      <p:spTgt spid="3"/>
+                    </p:tgtEl>
+                  </p:cond>
+                </p:stCondLst>
+                <p:endSync evt="end" delay="0">
+                  <p:rtn val="all"/>
+                </p:endSync>
+                <p:childTnLst>
+                  <p:par>
+                    <p:cTn id="9" fill="hold">
+                      <p:stCondLst>
+                        <p:cond delay="0"/>
+                      </p:stCondLst>
+                      <p:childTnLst>
+                        <p:par>
+                          <p:cTn id="10" fill="hold">
+                            <p:stCondLst>
+                              <p:cond delay="0"/>
+                            </p:stCondLst>
+                            <p:childTnLst>
+                              <p:par>
+                                <p:cTn id="11" presetID="2" presetClass="mediacall" presetSubtype="0" fill="hold" nodeType="clickEffect">
+                                  <p:stCondLst>
+                                    <p:cond delay="0"/>
+                                  </p:stCondLst>
+                                  <p:childTnLst>
+                                    <p:cmd type="call" cmd="togglePause">
+                                      <p:cBhvr>
+                                        <p:cTn id="12" dur="1" fill="hold"/>
+                                        <p:tgtEl>
+                                          <p:spTgt spid="3"/>
+                                        </p:tgtEl>
+                                      </p:cBhvr>
+                                    </p:cmd>
+                                  </p:childTnLst>
+                                </p:cTn>
+                              </p:par>
+                            </p:childTnLst>
+                          </p:cTn>
+                        </p:par>
+                      </p:childTnLst>
+                    </p:cTn>
+                  </p:par>
+                </p:childTnLst>
+              </p:cTn>
+              <p:nextCondLst>
+                <p:cond evt="onClick" delay="0">
+                  <p:tgtEl>
+                    <p:spTgt spid="3"/>
+                  </p:tgtEl>
+                </p:cond>
+              </p:nextCondLst>
+            </p:seq>
+          </p:childTnLst>
+        </p:cTn>
+      </p:par>
+    </p:tnLst>
+  </p:timing>
 </p:sld>
 </file>
 
@@ -3999,7 +4639,7 @@
         </p:nvSpPr>
         <p:spPr>
           <a:xfrm>
-            <a:off x="923544" y="694944"/>
+            <a:off x="1642000" y="676283"/>
             <a:ext cx="5788152" cy="2031325"/>
           </a:xfrm>
           <a:prstGeom prst="rect">
@@ -4064,6 +4704,42 @@
           </a:p>
         </p:txBody>
       </p:sp>
+      <p:pic>
+        <p:nvPicPr>
+          <p:cNvPr id="4" name="Picture 3" descr="A screenshot of a cell phone&#10;&#10;Description automatically generated">
+            <a:extLst>
+              <a:ext uri="{FF2B5EF4-FFF2-40B4-BE49-F238E27FC236}">
+                <a16:creationId xmlns:a16="http://schemas.microsoft.com/office/drawing/2014/main" id="{257068CE-9269-48D0-B628-C008B21186FC}"/>
+              </a:ext>
+            </a:extLst>
+          </p:cNvPr>
+          <p:cNvPicPr>
+            <a:picLocks noChangeAspect="1"/>
+          </p:cNvPicPr>
+          <p:nvPr/>
+        </p:nvPicPr>
+        <p:blipFill>
+          <a:blip r:embed="rId2">
+            <a:extLst>
+              <a:ext uri="{28A0092B-C50C-407E-A947-70E740481C1C}">
+                <a14:useLocalDpi xmlns:a14="http://schemas.microsoft.com/office/drawing/2010/main" val="0"/>
+              </a:ext>
+            </a:extLst>
+          </a:blip>
+          <a:stretch>
+            <a:fillRect/>
+          </a:stretch>
+        </p:blipFill>
+        <p:spPr>
+          <a:xfrm>
+            <a:off x="5997052" y="1398839"/>
+            <a:ext cx="5827389" cy="3931230"/>
+          </a:xfrm>
+          <a:prstGeom prst="rect">
+            <a:avLst/>
+          </a:prstGeom>
+        </p:spPr>
+      </p:pic>
     </p:spTree>
     <p:extLst>
       <p:ext uri="{BB962C8B-B14F-4D97-AF65-F5344CB8AC3E}">
@@ -4108,7 +4784,7 @@
         </p:nvSpPr>
         <p:spPr>
           <a:xfrm>
-            <a:off x="795528" y="676656"/>
+            <a:off x="1491815" y="651489"/>
             <a:ext cx="5879592" cy="2308324"/>
           </a:xfrm>
           <a:prstGeom prst="rect">
@@ -4187,6 +4863,42 @@
           </a:p>
         </p:txBody>
       </p:sp>
+      <p:pic>
+        <p:nvPicPr>
+          <p:cNvPr id="4" name="Picture 3" descr="A picture containing text&#10;&#10;Description automatically generated">
+            <a:extLst>
+              <a:ext uri="{FF2B5EF4-FFF2-40B4-BE49-F238E27FC236}">
+                <a16:creationId xmlns:a16="http://schemas.microsoft.com/office/drawing/2014/main" id="{F792CF5C-F5C8-4D74-8C01-8012A753248A}"/>
+              </a:ext>
+            </a:extLst>
+          </p:cNvPr>
+          <p:cNvPicPr>
+            <a:picLocks noChangeAspect="1"/>
+          </p:cNvPicPr>
+          <p:nvPr/>
+        </p:nvPicPr>
+        <p:blipFill>
+          <a:blip r:embed="rId2">
+            <a:extLst>
+              <a:ext uri="{28A0092B-C50C-407E-A947-70E740481C1C}">
+                <a14:useLocalDpi xmlns:a14="http://schemas.microsoft.com/office/drawing/2010/main" val="0"/>
+              </a:ext>
+            </a:extLst>
+          </a:blip>
+          <a:stretch>
+            <a:fillRect/>
+          </a:stretch>
+        </p:blipFill>
+        <p:spPr>
+          <a:xfrm>
+            <a:off x="7627675" y="520535"/>
+            <a:ext cx="3072510" cy="5462240"/>
+          </a:xfrm>
+          <a:prstGeom prst="rect">
+            <a:avLst/>
+          </a:prstGeom>
+        </p:spPr>
+      </p:pic>
     </p:spTree>
     <p:extLst>
       <p:ext uri="{BB962C8B-B14F-4D97-AF65-F5344CB8AC3E}">
@@ -4231,7 +4943,7 @@
         </p:nvSpPr>
         <p:spPr>
           <a:xfrm>
-            <a:off x="841248" y="704088"/>
+            <a:off x="1638202" y="662143"/>
             <a:ext cx="6291072" cy="3139321"/>
           </a:xfrm>
           <a:prstGeom prst="rect">
@@ -4344,9 +5056,9 @@
 </file>
 
 <file path=ppt/theme/theme1.xml><?xml version="1.0" encoding="utf-8"?>
-<a:theme xmlns:a="http://schemas.openxmlformats.org/drawingml/2006/main" name="Office Theme">
+<a:theme xmlns:a="http://schemas.openxmlformats.org/drawingml/2006/main" name="Retrospect">
   <a:themeElements>
-    <a:clrScheme name="Office">
+    <a:clrScheme name="Blue Green">
       <a:dk1>
         <a:sysClr val="windowText" lastClr="000000"/>
       </a:dk1>
@@ -4354,44 +5066,44 @@
         <a:sysClr val="window" lastClr="FFFFFF"/>
       </a:lt1>
       <a:dk2>
-        <a:srgbClr val="44546A"/>
+        <a:srgbClr val="373545"/>
       </a:dk2>
       <a:lt2>
-        <a:srgbClr val="E7E6E6"/>
+        <a:srgbClr val="CEDBE6"/>
       </a:lt2>
       <a:accent1>
-        <a:srgbClr val="4472C4"/>
+        <a:srgbClr val="3494BA"/>
       </a:accent1>
       <a:accent2>
-        <a:srgbClr val="ED7D31"/>
+        <a:srgbClr val="58B6C0"/>
       </a:accent2>
       <a:accent3>
-        <a:srgbClr val="A5A5A5"/>
+        <a:srgbClr val="75BDA7"/>
       </a:accent3>
       <a:accent4>
-        <a:srgbClr val="FFC000"/>
+        <a:srgbClr val="7A8C8E"/>
       </a:accent4>
       <a:accent5>
-        <a:srgbClr val="5B9BD5"/>
+        <a:srgbClr val="84ACB6"/>
       </a:accent5>
       <a:accent6>
-        <a:srgbClr val="70AD47"/>
+        <a:srgbClr val="2683C6"/>
       </a:accent6>
       <a:hlink>
-        <a:srgbClr val="0563C1"/>
+        <a:srgbClr val="6B9F25"/>
       </a:hlink>
       <a:folHlink>
-        <a:srgbClr val="954F72"/>
+        <a:srgbClr val="9F6715"/>
       </a:folHlink>
     </a:clrScheme>
-    <a:fontScheme name="Office">
+    <a:fontScheme name="Retrospect">
       <a:majorFont>
         <a:latin typeface="Calibri Light" panose="020F0302020204030204"/>
         <a:ea typeface=""/>
         <a:cs typeface=""/>
-        <a:font script="Jpan" typeface="游ゴシック Light"/>
+        <a:font script="Jpan" typeface="ＭＳ Ｐゴシック"/>
         <a:font script="Hang" typeface="맑은 고딕"/>
-        <a:font script="Hans" typeface="等线 Light"/>
+        <a:font script="Hans" typeface="宋体"/>
         <a:font script="Hant" typeface="新細明體"/>
         <a:font script="Arab" typeface="Times New Roman"/>
         <a:font script="Hebr" typeface="Times New Roman"/>
@@ -4419,31 +5131,14 @@
         <a:font script="Viet" typeface="Times New Roman"/>
         <a:font script="Uigh" typeface="Microsoft Uighur"/>
         <a:font script="Geor" typeface="Sylfaen"/>
-        <a:font script="Armn" typeface="Arial"/>
-        <a:font script="Bugi" typeface="Leelawadee UI"/>
-        <a:font script="Bopo" typeface="Microsoft JhengHei"/>
-        <a:font script="Java" typeface="Javanese Text"/>
-        <a:font script="Lisu" typeface="Segoe UI"/>
-        <a:font script="Mymr" typeface="Myanmar Text"/>
-        <a:font script="Nkoo" typeface="Ebrima"/>
-        <a:font script="Olck" typeface="Nirmala UI"/>
-        <a:font script="Osma" typeface="Ebrima"/>
-        <a:font script="Phag" typeface="Phagspa"/>
-        <a:font script="Syrn" typeface="Estrangelo Edessa"/>
-        <a:font script="Syrj" typeface="Estrangelo Edessa"/>
-        <a:font script="Syre" typeface="Estrangelo Edessa"/>
-        <a:font script="Sora" typeface="Nirmala UI"/>
-        <a:font script="Tale" typeface="Microsoft Tai Le"/>
-        <a:font script="Talu" typeface="Microsoft New Tai Lue"/>
-        <a:font script="Tfng" typeface="Ebrima"/>
       </a:majorFont>
       <a:minorFont>
         <a:latin typeface="Calibri" panose="020F0502020204030204"/>
         <a:ea typeface=""/>
         <a:cs typeface=""/>
-        <a:font script="Jpan" typeface="游ゴシック"/>
+        <a:font script="Jpan" typeface="ＭＳ Ｐゴシック"/>
         <a:font script="Hang" typeface="맑은 고딕"/>
-        <a:font script="Hans" typeface="等线"/>
+        <a:font script="Hans" typeface="宋体"/>
         <a:font script="Hant" typeface="新細明體"/>
         <a:font script="Arab" typeface="Arial"/>
         <a:font script="Hebr" typeface="Arial"/>
@@ -4471,26 +5166,9 @@
         <a:font script="Viet" typeface="Arial"/>
         <a:font script="Uigh" typeface="Microsoft Uighur"/>
         <a:font script="Geor" typeface="Sylfaen"/>
-        <a:font script="Armn" typeface="Arial"/>
-        <a:font script="Bugi" typeface="Leelawadee UI"/>
-        <a:font script="Bopo" typeface="Microsoft JhengHei"/>
-        <a:font script="Java" typeface="Javanese Text"/>
-        <a:font script="Lisu" typeface="Segoe UI"/>
-        <a:font script="Mymr" typeface="Myanmar Text"/>
-        <a:font script="Nkoo" typeface="Ebrima"/>
-        <a:font script="Olck" typeface="Nirmala UI"/>
-        <a:font script="Osma" typeface="Ebrima"/>
-        <a:font script="Phag" typeface="Phagspa"/>
-        <a:font script="Syrn" typeface="Estrangelo Edessa"/>
-        <a:font script="Syrj" typeface="Estrangelo Edessa"/>
-        <a:font script="Syre" typeface="Estrangelo Edessa"/>
-        <a:font script="Sora" typeface="Nirmala UI"/>
-        <a:font script="Tale" typeface="Microsoft Tai Le"/>
-        <a:font script="Talu" typeface="Microsoft New Tai Lue"/>
-        <a:font script="Tfng" typeface="Ebrima"/>
       </a:minorFont>
     </a:fontScheme>
-    <a:fmtScheme name="Office">
+    <a:fmtScheme name="Retrospect">
       <a:fillStyleLst>
         <a:solidFill>
           <a:schemeClr val="phClr"/>
@@ -4499,76 +5177,81 @@
           <a:gsLst>
             <a:gs pos="0">
               <a:schemeClr val="phClr">
-                <a:lumMod val="110000"/>
-                <a:satMod val="105000"/>
-                <a:tint val="67000"/>
+                <a:tint val="65000"/>
+                <a:shade val="92000"/>
+                <a:satMod val="130000"/>
               </a:schemeClr>
             </a:gs>
-            <a:gs pos="50000">
+            <a:gs pos="45000">
               <a:schemeClr val="phClr">
-                <a:lumMod val="105000"/>
-                <a:satMod val="103000"/>
-                <a:tint val="73000"/>
+                <a:tint val="60000"/>
+                <a:shade val="99000"/>
+                <a:satMod val="120000"/>
               </a:schemeClr>
             </a:gs>
             <a:gs pos="100000">
               <a:schemeClr val="phClr">
-                <a:lumMod val="105000"/>
-                <a:satMod val="109000"/>
-                <a:tint val="81000"/>
+                <a:tint val="55000"/>
+                <a:satMod val="140000"/>
               </a:schemeClr>
             </a:gs>
           </a:gsLst>
-          <a:lin ang="5400000" scaled="0"/>
+          <a:path path="circle">
+            <a:fillToRect l="100000" t="100000" r="100000" b="100000"/>
+          </a:path>
         </a:gradFill>
         <a:gradFill rotWithShape="1">
           <a:gsLst>
             <a:gs pos="0">
               <a:schemeClr val="phClr">
-                <a:satMod val="103000"/>
-                <a:lumMod val="102000"/>
-                <a:tint val="94000"/>
+                <a:shade val="85000"/>
+                <a:satMod val="130000"/>
               </a:schemeClr>
             </a:gs>
-            <a:gs pos="50000">
+            <a:gs pos="34000">
               <a:schemeClr val="phClr">
-                <a:satMod val="110000"/>
-                <a:lumMod val="100000"/>
-                <a:shade val="100000"/>
+                <a:shade val="87000"/>
+                <a:satMod val="125000"/>
+              </a:schemeClr>
+            </a:gs>
+            <a:gs pos="70000">
+              <a:schemeClr val="phClr">
+                <a:tint val="100000"/>
+                <a:shade val="90000"/>
+                <a:satMod val="130000"/>
               </a:schemeClr>
             </a:gs>
             <a:gs pos="100000">
               <a:schemeClr val="phClr">
-                <a:lumMod val="99000"/>
-                <a:satMod val="120000"/>
-                <a:shade val="78000"/>
+                <a:tint val="100000"/>
+                <a:shade val="100000"/>
+                <a:satMod val="110000"/>
               </a:schemeClr>
             </a:gs>
           </a:gsLst>
-          <a:lin ang="5400000" scaled="0"/>
+          <a:path path="circle">
+            <a:fillToRect l="100000" t="100000" r="100000" b="100000"/>
+          </a:path>
         </a:gradFill>
       </a:fillStyleLst>
       <a:lnStyleLst>
-        <a:ln w="6350" cap="flat" cmpd="sng" algn="ctr">
-          <a:solidFill>
-            <a:schemeClr val="phClr"/>
-          </a:solidFill>
-          <a:prstDash val="solid"/>
-          <a:miter lim="800000"/>
-        </a:ln>
         <a:ln w="12700" cap="flat" cmpd="sng" algn="ctr">
           <a:solidFill>
             <a:schemeClr val="phClr"/>
           </a:solidFill>
           <a:prstDash val="solid"/>
-          <a:miter lim="800000"/>
         </a:ln>
-        <a:ln w="19050" cap="flat" cmpd="sng" algn="ctr">
+        <a:ln w="15875" cap="flat" cmpd="sng" algn="ctr">
           <a:solidFill>
             <a:schemeClr val="phClr"/>
           </a:solidFill>
           <a:prstDash val="solid"/>
-          <a:miter lim="800000"/>
+        </a:ln>
+        <a:ln w="25400" cap="flat" cmpd="sng" algn="ctr">
+          <a:solidFill>
+            <a:schemeClr val="phClr"/>
+          </a:solidFill>
+          <a:prstDash val="solid"/>
         </a:ln>
       </a:lnStyleLst>
       <a:effectStyleLst>
@@ -4576,16 +5259,33 @@
           <a:effectLst/>
         </a:effectStyle>
         <a:effectStyle>
-          <a:effectLst/>
+          <a:effectLst>
+            <a:outerShdw blurRad="38100" dist="25400" dir="2700000" algn="br" rotWithShape="0">
+              <a:srgbClr val="000000">
+                <a:alpha val="60000"/>
+              </a:srgbClr>
+            </a:outerShdw>
+          </a:effectLst>
         </a:effectStyle>
         <a:effectStyle>
           <a:effectLst>
-            <a:outerShdw blurRad="57150" dist="19050" dir="5400000" algn="ctr" rotWithShape="0">
+            <a:outerShdw blurRad="44450" dist="25400" dir="2700000" algn="br" rotWithShape="0">
               <a:srgbClr val="000000">
-                <a:alpha val="63000"/>
+                <a:alpha val="60000"/>
               </a:srgbClr>
             </a:outerShdw>
           </a:effectLst>
+          <a:scene3d>
+            <a:camera prst="orthographicFront">
+              <a:rot lat="0" lon="0" rev="0"/>
+            </a:camera>
+            <a:lightRig rig="threePt" dir="t">
+              <a:rot lat="0" lon="0" rev="19800000"/>
+            </a:lightRig>
+          </a:scene3d>
+          <a:sp3d prstMaterial="flat">
+            <a:bevelT w="25400" h="31750"/>
+          </a:sp3d>
         </a:effectStyle>
       </a:effectStyleLst>
       <a:bgFillStyleLst>
@@ -4594,36 +5294,36 @@
         </a:solidFill>
         <a:solidFill>
           <a:schemeClr val="phClr">
-            <a:tint val="95000"/>
-            <a:satMod val="170000"/>
+            <a:tint val="90000"/>
+            <a:shade val="97000"/>
+            <a:satMod val="130000"/>
           </a:schemeClr>
         </a:solidFill>
         <a:gradFill rotWithShape="1">
           <a:gsLst>
             <a:gs pos="0">
               <a:schemeClr val="phClr">
-                <a:tint val="93000"/>
-                <a:satMod val="150000"/>
-                <a:shade val="98000"/>
-                <a:lumMod val="102000"/>
+                <a:tint val="96000"/>
+                <a:shade val="99000"/>
+                <a:satMod val="140000"/>
               </a:schemeClr>
             </a:gs>
-            <a:gs pos="50000">
+            <a:gs pos="65000">
               <a:schemeClr val="phClr">
-                <a:tint val="98000"/>
+                <a:tint val="100000"/>
+                <a:shade val="80000"/>
                 <a:satMod val="130000"/>
-                <a:shade val="90000"/>
-                <a:lumMod val="103000"/>
               </a:schemeClr>
             </a:gs>
             <a:gs pos="100000">
               <a:schemeClr val="phClr">
-                <a:shade val="63000"/>
+                <a:tint val="100000"/>
+                <a:shade val="48000"/>
                 <a:satMod val="120000"/>
               </a:schemeClr>
             </a:gs>
           </a:gsLst>
-          <a:lin ang="5400000" scaled="0"/>
+          <a:lin ang="16200000" scaled="0"/>
         </a:gradFill>
       </a:bgFillStyleLst>
     </a:fmtScheme>
@@ -4632,7 +5332,7 @@
   <a:extraClrSchemeLst/>
   <a:extLst>
     <a:ext uri="{05A4C25C-085E-4340-85A3-A5531E510DB2}">
-      <thm15:themeFamily xmlns:thm15="http://schemas.microsoft.com/office/thememl/2012/main" name="Office Theme" id="{62F939B6-93AF-4DB8-9C6B-D6C7DFDC589F}" vid="{4A3C46E8-61CC-4603-A589-7422A47A8E4A}"/>
+      <thm15:themeFamily xmlns:thm15="http://schemas.microsoft.com/office/thememl/2012/main" name="Retrospect" id="{5F128B03-DCCA-4EEB-AB3B-CF2899314A46}" vid="{3F1AAB62-24C6-49D2-8E01-B56FAC9A3DCD}"/>
     </a:ext>
   </a:extLst>
 </a:theme>

</xml_diff>